<commit_message>
Updated PPT and Notebook
</commit_message>
<xml_diff>
--- a/bootcamp_02/pythons/bootcamp 2023 v0.pptx
+++ b/bootcamp_02/pythons/bootcamp 2023 v0.pptx
@@ -6,12 +6,17 @@
   </p:sldMasterIdLst>
   <p:sldIdLst>
     <p:sldId id="256" r:id="rId2"/>
-    <p:sldId id="257" r:id="rId3"/>
-    <p:sldId id="258" r:id="rId4"/>
-    <p:sldId id="259" r:id="rId5"/>
-    <p:sldId id="260" r:id="rId6"/>
-    <p:sldId id="261" r:id="rId7"/>
-    <p:sldId id="262" r:id="rId8"/>
+    <p:sldId id="263" r:id="rId3"/>
+    <p:sldId id="266" r:id="rId4"/>
+    <p:sldId id="267" r:id="rId5"/>
+    <p:sldId id="264" r:id="rId6"/>
+    <p:sldId id="257" r:id="rId7"/>
+    <p:sldId id="258" r:id="rId8"/>
+    <p:sldId id="259" r:id="rId9"/>
+    <p:sldId id="265" r:id="rId10"/>
+    <p:sldId id="260" r:id="rId11"/>
+    <p:sldId id="261" r:id="rId12"/>
+    <p:sldId id="262" r:id="rId13"/>
   </p:sldIdLst>
   <p:sldSz cx="12192000" cy="6858000"/>
   <p:notesSz cx="6858000" cy="9144000"/>
@@ -249,7 +254,7 @@
           <a:p>
             <a:fld id="{7374B152-1831-485D-A9D4-EB75696E09AC}" type="datetimeFigureOut">
               <a:rPr lang="en-US" smtClean="0"/>
-              <a:t>5/3/2023</a:t>
+              <a:t>5/26/2023</a:t>
             </a:fld>
             <a:endParaRPr lang="en-US"/>
           </a:p>
@@ -419,7 +424,7 @@
           <a:p>
             <a:fld id="{7374B152-1831-485D-A9D4-EB75696E09AC}" type="datetimeFigureOut">
               <a:rPr lang="en-US" smtClean="0"/>
-              <a:t>5/3/2023</a:t>
+              <a:t>5/26/2023</a:t>
             </a:fld>
             <a:endParaRPr lang="en-US"/>
           </a:p>
@@ -599,7 +604,7 @@
           <a:p>
             <a:fld id="{7374B152-1831-485D-A9D4-EB75696E09AC}" type="datetimeFigureOut">
               <a:rPr lang="en-US" smtClean="0"/>
-              <a:t>5/3/2023</a:t>
+              <a:t>5/26/2023</a:t>
             </a:fld>
             <a:endParaRPr lang="en-US"/>
           </a:p>
@@ -769,7 +774,7 @@
           <a:p>
             <a:fld id="{7374B152-1831-485D-A9D4-EB75696E09AC}" type="datetimeFigureOut">
               <a:rPr lang="en-US" smtClean="0"/>
-              <a:t>5/3/2023</a:t>
+              <a:t>5/26/2023</a:t>
             </a:fld>
             <a:endParaRPr lang="en-US"/>
           </a:p>
@@ -1015,7 +1020,7 @@
           <a:p>
             <a:fld id="{7374B152-1831-485D-A9D4-EB75696E09AC}" type="datetimeFigureOut">
               <a:rPr lang="en-US" smtClean="0"/>
-              <a:t>5/3/2023</a:t>
+              <a:t>5/26/2023</a:t>
             </a:fld>
             <a:endParaRPr lang="en-US"/>
           </a:p>
@@ -1247,7 +1252,7 @@
           <a:p>
             <a:fld id="{7374B152-1831-485D-A9D4-EB75696E09AC}" type="datetimeFigureOut">
               <a:rPr lang="en-US" smtClean="0"/>
-              <a:t>5/3/2023</a:t>
+              <a:t>5/26/2023</a:t>
             </a:fld>
             <a:endParaRPr lang="en-US"/>
           </a:p>
@@ -1614,7 +1619,7 @@
           <a:p>
             <a:fld id="{7374B152-1831-485D-A9D4-EB75696E09AC}" type="datetimeFigureOut">
               <a:rPr lang="en-US" smtClean="0"/>
-              <a:t>5/3/2023</a:t>
+              <a:t>5/26/2023</a:t>
             </a:fld>
             <a:endParaRPr lang="en-US"/>
           </a:p>
@@ -1732,7 +1737,7 @@
           <a:p>
             <a:fld id="{7374B152-1831-485D-A9D4-EB75696E09AC}" type="datetimeFigureOut">
               <a:rPr lang="en-US" smtClean="0"/>
-              <a:t>5/3/2023</a:t>
+              <a:t>5/26/2023</a:t>
             </a:fld>
             <a:endParaRPr lang="en-US"/>
           </a:p>
@@ -1827,7 +1832,7 @@
           <a:p>
             <a:fld id="{7374B152-1831-485D-A9D4-EB75696E09AC}" type="datetimeFigureOut">
               <a:rPr lang="en-US" smtClean="0"/>
-              <a:t>5/3/2023</a:t>
+              <a:t>5/26/2023</a:t>
             </a:fld>
             <a:endParaRPr lang="en-US"/>
           </a:p>
@@ -2104,7 +2109,7 @@
           <a:p>
             <a:fld id="{7374B152-1831-485D-A9D4-EB75696E09AC}" type="datetimeFigureOut">
               <a:rPr lang="en-US" smtClean="0"/>
-              <a:t>5/3/2023</a:t>
+              <a:t>5/26/2023</a:t>
             </a:fld>
             <a:endParaRPr lang="en-US"/>
           </a:p>
@@ -2357,7 +2362,7 @@
           <a:p>
             <a:fld id="{7374B152-1831-485D-A9D4-EB75696E09AC}" type="datetimeFigureOut">
               <a:rPr lang="en-US" smtClean="0"/>
-              <a:t>5/3/2023</a:t>
+              <a:t>5/26/2023</a:t>
             </a:fld>
             <a:endParaRPr lang="en-US"/>
           </a:p>
@@ -2570,7 +2575,7 @@
           <a:p>
             <a:fld id="{7374B152-1831-485D-A9D4-EB75696E09AC}" type="datetimeFigureOut">
               <a:rPr lang="en-US" smtClean="0"/>
-              <a:t>5/3/2023</a:t>
+              <a:t>5/26/2023</a:t>
             </a:fld>
             <a:endParaRPr lang="en-US"/>
           </a:p>
@@ -3060,10 +3065,3216 @@
   <p:clrMapOvr>
     <a:masterClrMapping/>
   </p:clrMapOvr>
+  <p:timing>
+    <p:tnLst>
+      <p:par>
+        <p:cTn id="1" dur="indefinite" restart="never" nodeType="tmRoot"/>
+      </p:par>
+    </p:tnLst>
+  </p:timing>
+</p:sld>
+</file>
+
+<file path=ppt/slides/slide10.xml><?xml version="1.0" encoding="utf-8"?>
+<p:sld xmlns:a="http://schemas.openxmlformats.org/drawingml/2006/main" xmlns:r="http://schemas.openxmlformats.org/officeDocument/2006/relationships" xmlns:p="http://schemas.openxmlformats.org/presentationml/2006/main">
+  <p:cSld>
+    <p:spTree>
+      <p:nvGrpSpPr>
+        <p:cNvPr id="1" name=""/>
+        <p:cNvGrpSpPr/>
+        <p:nvPr/>
+      </p:nvGrpSpPr>
+      <p:grpSpPr>
+        <a:xfrm>
+          <a:off x="0" y="0"/>
+          <a:ext cx="0" cy="0"/>
+          <a:chOff x="0" y="0"/>
+          <a:chExt cx="0" cy="0"/>
+        </a:xfrm>
+      </p:grpSpPr>
+      <p:sp>
+        <p:nvSpPr>
+          <p:cNvPr id="2" name="Title 1"/>
+          <p:cNvSpPr>
+            <a:spLocks noGrp="1"/>
+          </p:cNvSpPr>
+          <p:nvPr>
+            <p:ph type="title"/>
+          </p:nvPr>
+        </p:nvSpPr>
+        <p:spPr>
+          <a:xfrm>
+            <a:off x="838200" y="365125"/>
+            <a:ext cx="10515600" cy="662397"/>
+          </a:xfrm>
+        </p:spPr>
+        <p:txBody>
+          <a:bodyPr>
+            <a:normAutofit/>
+          </a:bodyPr>
+          <a:lstStyle/>
+          <a:p>
+            <a:r>
+              <a:rPr lang="en-US" sz="3600" dirty="0" smtClean="0"/>
+              <a:t>Data for the </a:t>
+            </a:r>
+            <a:r>
+              <a:rPr lang="en-US" sz="3600" b="1" i="1" dirty="0" smtClean="0"/>
+              <a:t>algorithm</a:t>
+            </a:r>
+            <a:endParaRPr lang="en-US" sz="3600" b="1" i="1" dirty="0"/>
+          </a:p>
+        </p:txBody>
+      </p:sp>
+      <p:sp>
+        <p:nvSpPr>
+          <p:cNvPr id="3" name="Content Placeholder 2"/>
+          <p:cNvSpPr>
+            <a:spLocks noGrp="1"/>
+          </p:cNvSpPr>
+          <p:nvPr>
+            <p:ph idx="1"/>
+          </p:nvPr>
+        </p:nvSpPr>
+        <p:spPr>
+          <a:xfrm>
+            <a:off x="838200" y="1517715"/>
+            <a:ext cx="10515600" cy="4659248"/>
+          </a:xfrm>
+        </p:spPr>
+        <p:txBody>
+          <a:bodyPr>
+            <a:normAutofit/>
+          </a:bodyPr>
+          <a:lstStyle/>
+          <a:p>
+            <a:r>
+              <a:rPr lang="en-US" sz="2000" dirty="0" smtClean="0"/>
+              <a:t>Large images may require partition</a:t>
+            </a:r>
+          </a:p>
+          <a:p>
+            <a:r>
+              <a:rPr lang="en-US" sz="2000" dirty="0" smtClean="0"/>
+              <a:t>Use the partition of the </a:t>
+            </a:r>
+            <a:r>
+              <a:rPr lang="en-US" sz="2000" i="1" u="sng" dirty="0" smtClean="0"/>
+              <a:t>masked </a:t>
+            </a:r>
+            <a:r>
+              <a:rPr lang="en-US" sz="2000" dirty="0" smtClean="0"/>
+              <a:t>image</a:t>
+            </a:r>
+          </a:p>
+          <a:p>
+            <a:r>
+              <a:rPr lang="en-US" sz="2000" dirty="0" smtClean="0"/>
+              <a:t>The mask plays important role</a:t>
+            </a:r>
+          </a:p>
+          <a:p>
+            <a:r>
+              <a:rPr lang="en-US" sz="2000" dirty="0" smtClean="0"/>
+              <a:t>Save your every output!!</a:t>
+            </a:r>
+            <a:endParaRPr lang="en-US" sz="2000" dirty="0"/>
+          </a:p>
+        </p:txBody>
+      </p:sp>
+      <p:pic>
+        <p:nvPicPr>
+          <p:cNvPr id="4" name="Picture"/>
+          <p:cNvPicPr>
+            <a:picLocks noChangeAspect="1"/>
+          </p:cNvPicPr>
+          <p:nvPr/>
+        </p:nvPicPr>
+        <p:blipFill>
+          <a:blip r:embed="rId2"/>
+          <a:stretch>
+            <a:fillRect/>
+          </a:stretch>
+        </p:blipFill>
+        <p:spPr bwMode="auto">
+          <a:xfrm>
+            <a:off x="295461" y="3381415"/>
+            <a:ext cx="11601077" cy="2708299"/>
+          </a:xfrm>
+          <a:prstGeom prst="rect">
+            <a:avLst/>
+          </a:prstGeom>
+          <a:noFill/>
+          <a:ln w="9525">
+            <a:noFill/>
+            <a:headEnd/>
+            <a:tailEnd/>
+          </a:ln>
+        </p:spPr>
+      </p:pic>
+    </p:spTree>
+    <p:extLst>
+      <p:ext uri="{BB962C8B-B14F-4D97-AF65-F5344CB8AC3E}">
+        <p14:creationId xmlns:p14="http://schemas.microsoft.com/office/powerpoint/2010/main" val="2421962130"/>
+      </p:ext>
+    </p:extLst>
+  </p:cSld>
+  <p:clrMapOvr>
+    <a:masterClrMapping/>
+  </p:clrMapOvr>
+  <p:timing>
+    <p:tnLst>
+      <p:par>
+        <p:cTn id="1" dur="indefinite" restart="never" nodeType="tmRoot"/>
+      </p:par>
+    </p:tnLst>
+  </p:timing>
+</p:sld>
+</file>
+
+<file path=ppt/slides/slide11.xml><?xml version="1.0" encoding="utf-8"?>
+<p:sld xmlns:a="http://schemas.openxmlformats.org/drawingml/2006/main" xmlns:r="http://schemas.openxmlformats.org/officeDocument/2006/relationships" xmlns:p="http://schemas.openxmlformats.org/presentationml/2006/main">
+  <p:cSld>
+    <p:spTree>
+      <p:nvGrpSpPr>
+        <p:cNvPr id="1" name=""/>
+        <p:cNvGrpSpPr/>
+        <p:nvPr/>
+      </p:nvGrpSpPr>
+      <p:grpSpPr>
+        <a:xfrm>
+          <a:off x="0" y="0"/>
+          <a:ext cx="0" cy="0"/>
+          <a:chOff x="0" y="0"/>
+          <a:chExt cx="0" cy="0"/>
+        </a:xfrm>
+      </p:grpSpPr>
+      <p:sp>
+        <p:nvSpPr>
+          <p:cNvPr id="2" name="Title 1"/>
+          <p:cNvSpPr>
+            <a:spLocks noGrp="1"/>
+          </p:cNvSpPr>
+          <p:nvPr>
+            <p:ph type="title"/>
+          </p:nvPr>
+        </p:nvSpPr>
+        <p:spPr>
+          <a:xfrm>
+            <a:off x="838200" y="365126"/>
+            <a:ext cx="10515600" cy="511568"/>
+          </a:xfrm>
+        </p:spPr>
+        <p:txBody>
+          <a:bodyPr>
+            <a:normAutofit fontScale="90000"/>
+          </a:bodyPr>
+          <a:lstStyle/>
+          <a:p>
+            <a:r>
+              <a:rPr lang="en-US" sz="4000" dirty="0" smtClean="0"/>
+              <a:t>Hands-on</a:t>
+            </a:r>
+            <a:endParaRPr lang="en-US" sz="3600" dirty="0"/>
+          </a:p>
+        </p:txBody>
+      </p:sp>
+      <p:sp>
+        <p:nvSpPr>
+          <p:cNvPr id="3" name="Content Placeholder 2"/>
+          <p:cNvSpPr>
+            <a:spLocks noGrp="1"/>
+          </p:cNvSpPr>
+          <p:nvPr>
+            <p:ph idx="1"/>
+          </p:nvPr>
+        </p:nvSpPr>
+        <p:spPr/>
+        <p:txBody>
+          <a:bodyPr>
+            <a:normAutofit/>
+          </a:bodyPr>
+          <a:lstStyle/>
+          <a:p>
+            <a:r>
+              <a:rPr lang="en-US" sz="2000" dirty="0" smtClean="0"/>
+              <a:t>Dataset: kaggle.com/datasets/</a:t>
+            </a:r>
+            <a:r>
+              <a:rPr lang="en-US" sz="2000" dirty="0" err="1" smtClean="0"/>
+              <a:t>preetviradiya</a:t>
+            </a:r>
+            <a:r>
+              <a:rPr lang="en-US" sz="2000" dirty="0" smtClean="0"/>
+              <a:t>/covid19-radiography-dataset</a:t>
+            </a:r>
+          </a:p>
+          <a:p>
+            <a:pPr lvl="1"/>
+            <a:r>
+              <a:rPr lang="en-US" sz="1600" dirty="0" smtClean="0"/>
+              <a:t>X-rays of lungs: Normal (Healthy), </a:t>
+            </a:r>
+            <a:r>
+              <a:rPr lang="en-US" sz="1600" dirty="0" err="1" smtClean="0"/>
+              <a:t>Covid</a:t>
+            </a:r>
+            <a:r>
+              <a:rPr lang="en-US" sz="1600" dirty="0" smtClean="0"/>
+              <a:t>, </a:t>
+            </a:r>
+            <a:r>
+              <a:rPr lang="en-US" sz="1600" dirty="0" err="1" smtClean="0"/>
+              <a:t>etc</a:t>
+            </a:r>
+            <a:endParaRPr lang="en-US" sz="1600" dirty="0"/>
+          </a:p>
+          <a:p>
+            <a:r>
+              <a:rPr lang="en-US" sz="2000" dirty="0" smtClean="0"/>
+              <a:t>Download </a:t>
+            </a:r>
+            <a:endParaRPr lang="en-US" sz="2000" dirty="0"/>
+          </a:p>
+          <a:p>
+            <a:pPr lvl="1"/>
+            <a:r>
+              <a:rPr lang="en-US" sz="1600" dirty="0" smtClean="0"/>
+              <a:t>N images from Normal </a:t>
+            </a:r>
+            <a:r>
+              <a:rPr lang="en-US" sz="1600" dirty="0" smtClean="0"/>
+              <a:t>set</a:t>
+            </a:r>
+            <a:endParaRPr lang="en-US" sz="1600" dirty="0"/>
+          </a:p>
+          <a:p>
+            <a:pPr lvl="1"/>
+            <a:r>
+              <a:rPr lang="en-US" sz="1600" dirty="0" smtClean="0"/>
+              <a:t>N images from </a:t>
+            </a:r>
+            <a:r>
+              <a:rPr lang="en-US" sz="1600" dirty="0" smtClean="0"/>
+              <a:t>COVID set</a:t>
+            </a:r>
+            <a:endParaRPr lang="en-US" sz="1600" dirty="0" smtClean="0"/>
+          </a:p>
+          <a:p>
+            <a:pPr lvl="1"/>
+            <a:r>
+              <a:rPr lang="en-US" sz="1600" dirty="0" smtClean="0"/>
+              <a:t>N </a:t>
+            </a:r>
+            <a:r>
+              <a:rPr lang="en-US" sz="1600" dirty="0" smtClean="0"/>
+              <a:t>== 1</a:t>
+            </a:r>
+            <a:r>
+              <a:rPr lang="en-US" sz="1600" dirty="0" smtClean="0"/>
+              <a:t> </a:t>
+            </a:r>
+            <a:r>
+              <a:rPr lang="en-US" sz="1600" dirty="0" smtClean="0"/>
+              <a:t>for today</a:t>
+            </a:r>
+          </a:p>
+          <a:p>
+            <a:r>
+              <a:rPr lang="en-US" sz="2000" dirty="0" smtClean="0"/>
+              <a:t>Organize images</a:t>
+            </a:r>
+          </a:p>
+          <a:p>
+            <a:r>
+              <a:rPr lang="en-US" sz="2000" dirty="0" smtClean="0"/>
+              <a:t>Produce annotations</a:t>
+            </a:r>
+          </a:p>
+          <a:p>
+            <a:r>
+              <a:rPr lang="en-US" sz="2000" dirty="0" smtClean="0"/>
+              <a:t>Follow the me in </a:t>
+            </a:r>
+            <a:r>
+              <a:rPr lang="en-US" sz="2000" dirty="0" err="1" smtClean="0"/>
+              <a:t>Jupyter</a:t>
+            </a:r>
+            <a:r>
+              <a:rPr lang="en-US" sz="2000" dirty="0" smtClean="0"/>
+              <a:t> </a:t>
+            </a:r>
+          </a:p>
+          <a:p>
+            <a:endParaRPr lang="en-US" sz="2000" dirty="0"/>
+          </a:p>
+        </p:txBody>
+      </p:sp>
+      <p:pic>
+        <p:nvPicPr>
+          <p:cNvPr id="6" name="Picture 5"/>
+          <p:cNvPicPr>
+            <a:picLocks noChangeAspect="1"/>
+          </p:cNvPicPr>
+          <p:nvPr/>
+        </p:nvPicPr>
+        <p:blipFill>
+          <a:blip r:embed="rId2"/>
+          <a:stretch>
+            <a:fillRect/>
+          </a:stretch>
+        </p:blipFill>
+        <p:spPr>
+          <a:xfrm>
+            <a:off x="4128941" y="2682394"/>
+            <a:ext cx="7633796" cy="2986355"/>
+          </a:xfrm>
+          <a:prstGeom prst="rect">
+            <a:avLst/>
+          </a:prstGeom>
+          <a:ln w="28575">
+            <a:solidFill>
+              <a:srgbClr val="00B050"/>
+            </a:solidFill>
+          </a:ln>
+        </p:spPr>
+      </p:pic>
+      <p:sp>
+        <p:nvSpPr>
+          <p:cNvPr id="7" name="Explosion 2 6"/>
+          <p:cNvSpPr/>
+          <p:nvPr/>
+        </p:nvSpPr>
+        <p:spPr>
+          <a:xfrm rot="1403211">
+            <a:off x="9366463" y="3237400"/>
+            <a:ext cx="3097586" cy="2787861"/>
+          </a:xfrm>
+          <a:prstGeom prst="irregularSeal2">
+            <a:avLst/>
+          </a:prstGeom>
+          <a:noFill/>
+          <a:ln w="38100">
+            <a:solidFill>
+              <a:srgbClr val="FF0000"/>
+            </a:solidFill>
+          </a:ln>
+        </p:spPr>
+        <p:style>
+          <a:lnRef idx="2">
+            <a:schemeClr val="accent1">
+              <a:shade val="50000"/>
+            </a:schemeClr>
+          </a:lnRef>
+          <a:fillRef idx="1">
+            <a:schemeClr val="accent1"/>
+          </a:fillRef>
+          <a:effectRef idx="0">
+            <a:schemeClr val="accent1"/>
+          </a:effectRef>
+          <a:fontRef idx="minor">
+            <a:schemeClr val="lt1"/>
+          </a:fontRef>
+        </p:style>
+        <p:txBody>
+          <a:bodyPr rtlCol="0" anchor="ctr"/>
+          <a:lstStyle/>
+          <a:p>
+            <a:pPr algn="ctr"/>
+            <a:endParaRPr lang="en-US"/>
+          </a:p>
+        </p:txBody>
+      </p:sp>
+    </p:spTree>
+    <p:extLst>
+      <p:ext uri="{BB962C8B-B14F-4D97-AF65-F5344CB8AC3E}">
+        <p14:creationId xmlns:p14="http://schemas.microsoft.com/office/powerpoint/2010/main" val="2006271638"/>
+      </p:ext>
+    </p:extLst>
+  </p:cSld>
+  <p:clrMapOvr>
+    <a:masterClrMapping/>
+  </p:clrMapOvr>
+</p:sld>
+</file>
+
+<file path=ppt/slides/slide12.xml><?xml version="1.0" encoding="utf-8"?>
+<p:sld xmlns:a="http://schemas.openxmlformats.org/drawingml/2006/main" xmlns:r="http://schemas.openxmlformats.org/officeDocument/2006/relationships" xmlns:p="http://schemas.openxmlformats.org/presentationml/2006/main">
+  <p:cSld>
+    <p:spTree>
+      <p:nvGrpSpPr>
+        <p:cNvPr id="1" name=""/>
+        <p:cNvGrpSpPr/>
+        <p:nvPr/>
+      </p:nvGrpSpPr>
+      <p:grpSpPr>
+        <a:xfrm>
+          <a:off x="0" y="0"/>
+          <a:ext cx="0" cy="0"/>
+          <a:chOff x="0" y="0"/>
+          <a:chExt cx="0" cy="0"/>
+        </a:xfrm>
+      </p:grpSpPr>
+      <p:sp>
+        <p:nvSpPr>
+          <p:cNvPr id="2" name="Title 1"/>
+          <p:cNvSpPr>
+            <a:spLocks noGrp="1"/>
+          </p:cNvSpPr>
+          <p:nvPr>
+            <p:ph type="title"/>
+          </p:nvPr>
+        </p:nvSpPr>
+        <p:spPr>
+          <a:xfrm>
+            <a:off x="838200" y="365126"/>
+            <a:ext cx="10515600" cy="511568"/>
+          </a:xfrm>
+        </p:spPr>
+        <p:txBody>
+          <a:bodyPr>
+            <a:normAutofit fontScale="90000"/>
+          </a:bodyPr>
+          <a:lstStyle/>
+          <a:p>
+            <a:r>
+              <a:rPr lang="en-US" sz="4000" dirty="0" smtClean="0"/>
+              <a:t>Hands-on</a:t>
+            </a:r>
+            <a:endParaRPr lang="en-US" sz="3600" dirty="0"/>
+          </a:p>
+        </p:txBody>
+      </p:sp>
+      <p:sp>
+        <p:nvSpPr>
+          <p:cNvPr id="3" name="Content Placeholder 2"/>
+          <p:cNvSpPr>
+            <a:spLocks noGrp="1"/>
+          </p:cNvSpPr>
+          <p:nvPr>
+            <p:ph idx="1"/>
+          </p:nvPr>
+        </p:nvSpPr>
+        <p:spPr/>
+        <p:txBody>
+          <a:bodyPr>
+            <a:normAutofit/>
+          </a:bodyPr>
+          <a:lstStyle/>
+          <a:p>
+            <a:r>
+              <a:rPr lang="en-US" sz="2000" dirty="0" smtClean="0"/>
+              <a:t>Dataset: kaggle.com/datasets/</a:t>
+            </a:r>
+            <a:r>
+              <a:rPr lang="en-US" sz="2000" dirty="0" err="1" smtClean="0"/>
+              <a:t>preetviradiya</a:t>
+            </a:r>
+            <a:r>
+              <a:rPr lang="en-US" sz="2000" dirty="0" smtClean="0"/>
+              <a:t>/covid19-radiography-dataset</a:t>
+            </a:r>
+          </a:p>
+          <a:p>
+            <a:pPr lvl="1"/>
+            <a:r>
+              <a:rPr lang="en-US" sz="1600" dirty="0" smtClean="0"/>
+              <a:t>X-rays of lungs: Normal (Healthy), </a:t>
+            </a:r>
+            <a:r>
+              <a:rPr lang="en-US" sz="1600" dirty="0" err="1" smtClean="0"/>
+              <a:t>Covid</a:t>
+            </a:r>
+            <a:r>
+              <a:rPr lang="en-US" sz="1600" dirty="0" smtClean="0"/>
+              <a:t>, </a:t>
+            </a:r>
+            <a:r>
+              <a:rPr lang="en-US" sz="1600" dirty="0" err="1" smtClean="0"/>
+              <a:t>etc</a:t>
+            </a:r>
+            <a:endParaRPr lang="en-US" sz="1600" dirty="0"/>
+          </a:p>
+          <a:p>
+            <a:r>
+              <a:rPr lang="en-US" sz="2000" dirty="0" smtClean="0"/>
+              <a:t>Download </a:t>
+            </a:r>
+            <a:endParaRPr lang="en-US" sz="2000" dirty="0"/>
+          </a:p>
+          <a:p>
+            <a:pPr lvl="1"/>
+            <a:r>
+              <a:rPr lang="en-US" sz="1600" dirty="0" smtClean="0"/>
+              <a:t>N images from Normal </a:t>
+            </a:r>
+            <a:r>
+              <a:rPr lang="en-US" sz="1600" dirty="0" smtClean="0"/>
+              <a:t>set</a:t>
+            </a:r>
+            <a:endParaRPr lang="en-US" sz="1600" dirty="0"/>
+          </a:p>
+          <a:p>
+            <a:pPr lvl="1"/>
+            <a:r>
+              <a:rPr lang="en-US" sz="1600" dirty="0" smtClean="0"/>
+              <a:t>N images from </a:t>
+            </a:r>
+            <a:r>
+              <a:rPr lang="en-US" sz="1600" dirty="0" smtClean="0"/>
+              <a:t>COVID set</a:t>
+            </a:r>
+            <a:endParaRPr lang="en-US" sz="1600" dirty="0" smtClean="0"/>
+          </a:p>
+          <a:p>
+            <a:pPr lvl="1"/>
+            <a:r>
+              <a:rPr lang="en-US" sz="1600" dirty="0" smtClean="0"/>
+              <a:t>N </a:t>
+            </a:r>
+            <a:r>
+              <a:rPr lang="en-US" sz="1600" dirty="0" smtClean="0"/>
+              <a:t>== 1 </a:t>
+            </a:r>
+            <a:r>
+              <a:rPr lang="en-US" sz="1600" dirty="0" smtClean="0"/>
+              <a:t>for today</a:t>
+            </a:r>
+          </a:p>
+          <a:p>
+            <a:r>
+              <a:rPr lang="en-US" sz="2000" dirty="0" smtClean="0"/>
+              <a:t>Organize images</a:t>
+            </a:r>
+          </a:p>
+          <a:p>
+            <a:r>
+              <a:rPr lang="en-US" sz="2000" dirty="0" smtClean="0"/>
+              <a:t>Produce annotations</a:t>
+            </a:r>
+          </a:p>
+          <a:p>
+            <a:r>
+              <a:rPr lang="en-US" sz="2000" dirty="0" smtClean="0"/>
+              <a:t>Follow the me in </a:t>
+            </a:r>
+            <a:r>
+              <a:rPr lang="en-US" sz="2000" dirty="0" err="1" smtClean="0"/>
+              <a:t>Jupyter</a:t>
+            </a:r>
+            <a:r>
+              <a:rPr lang="en-US" sz="2000" dirty="0" smtClean="0"/>
+              <a:t> </a:t>
+            </a:r>
+          </a:p>
+          <a:p>
+            <a:endParaRPr lang="en-US" sz="2000" dirty="0"/>
+          </a:p>
+        </p:txBody>
+      </p:sp>
+      <p:pic>
+        <p:nvPicPr>
+          <p:cNvPr id="6" name="Picture 5"/>
+          <p:cNvPicPr>
+            <a:picLocks noChangeAspect="1"/>
+          </p:cNvPicPr>
+          <p:nvPr/>
+        </p:nvPicPr>
+        <p:blipFill>
+          <a:blip r:embed="rId2"/>
+          <a:stretch>
+            <a:fillRect/>
+          </a:stretch>
+        </p:blipFill>
+        <p:spPr>
+          <a:xfrm>
+            <a:off x="4761862" y="2820774"/>
+            <a:ext cx="7000875" cy="2847975"/>
+          </a:xfrm>
+          <a:prstGeom prst="rect">
+            <a:avLst/>
+          </a:prstGeom>
+          <a:ln w="28575">
+            <a:solidFill>
+              <a:srgbClr val="00B050"/>
+            </a:solidFill>
+          </a:ln>
+        </p:spPr>
+      </p:pic>
+    </p:spTree>
+    <p:extLst>
+      <p:ext uri="{BB962C8B-B14F-4D97-AF65-F5344CB8AC3E}">
+        <p14:creationId xmlns:p14="http://schemas.microsoft.com/office/powerpoint/2010/main" val="707485935"/>
+      </p:ext>
+    </p:extLst>
+  </p:cSld>
+  <p:clrMapOvr>
+    <a:masterClrMapping/>
+  </p:clrMapOvr>
 </p:sld>
 </file>
 
 <file path=ppt/slides/slide2.xml><?xml version="1.0" encoding="utf-8"?>
+<p:sld xmlns:a="http://schemas.openxmlformats.org/drawingml/2006/main" xmlns:r="http://schemas.openxmlformats.org/officeDocument/2006/relationships" xmlns:p="http://schemas.openxmlformats.org/presentationml/2006/main">
+  <p:cSld>
+    <p:spTree>
+      <p:nvGrpSpPr>
+        <p:cNvPr id="1" name=""/>
+        <p:cNvGrpSpPr/>
+        <p:nvPr/>
+      </p:nvGrpSpPr>
+      <p:grpSpPr>
+        <a:xfrm>
+          <a:off x="0" y="0"/>
+          <a:ext cx="0" cy="0"/>
+          <a:chOff x="0" y="0"/>
+          <a:chExt cx="0" cy="0"/>
+        </a:xfrm>
+      </p:grpSpPr>
+      <p:sp>
+        <p:nvSpPr>
+          <p:cNvPr id="2" name="Title 1"/>
+          <p:cNvSpPr>
+            <a:spLocks noGrp="1"/>
+          </p:cNvSpPr>
+          <p:nvPr>
+            <p:ph type="title"/>
+          </p:nvPr>
+        </p:nvSpPr>
+        <p:spPr>
+          <a:xfrm>
+            <a:off x="838200" y="365125"/>
+            <a:ext cx="10515600" cy="448691"/>
+          </a:xfrm>
+        </p:spPr>
+        <p:txBody>
+          <a:bodyPr>
+            <a:noAutofit/>
+          </a:bodyPr>
+          <a:lstStyle/>
+          <a:p>
+            <a:r>
+              <a:rPr lang="en-US" sz="3600" dirty="0" smtClean="0"/>
+              <a:t>AI vs Doctors</a:t>
+            </a:r>
+            <a:endParaRPr lang="en-US" sz="3600" dirty="0"/>
+          </a:p>
+        </p:txBody>
+      </p:sp>
+      <p:sp>
+        <p:nvSpPr>
+          <p:cNvPr id="3" name="Content Placeholder 2"/>
+          <p:cNvSpPr>
+            <a:spLocks noGrp="1"/>
+          </p:cNvSpPr>
+          <p:nvPr>
+            <p:ph idx="1"/>
+          </p:nvPr>
+        </p:nvSpPr>
+        <p:spPr>
+          <a:xfrm>
+            <a:off x="838200" y="1825624"/>
+            <a:ext cx="10515600" cy="4730623"/>
+          </a:xfrm>
+        </p:spPr>
+        <p:txBody>
+          <a:bodyPr/>
+          <a:lstStyle/>
+          <a:p>
+            <a:r>
+              <a:rPr lang="en-US" dirty="0" smtClean="0"/>
+              <a:t>1x             +          1x                                      =  1x       </a:t>
+            </a:r>
+            <a:endParaRPr lang="en-US" dirty="0" smtClean="0"/>
+          </a:p>
+          <a:p>
+            <a:endParaRPr lang="en-US" dirty="0" smtClean="0"/>
+          </a:p>
+          <a:p>
+            <a:endParaRPr lang="en-US" dirty="0"/>
+          </a:p>
+          <a:p>
+            <a:endParaRPr lang="en-US" dirty="0" smtClean="0"/>
+          </a:p>
+          <a:p>
+            <a:endParaRPr lang="en-US" dirty="0"/>
+          </a:p>
+          <a:p>
+            <a:endParaRPr lang="en-US" dirty="0" smtClean="0"/>
+          </a:p>
+          <a:p>
+            <a:endParaRPr lang="en-US" dirty="0" smtClean="0"/>
+          </a:p>
+        </p:txBody>
+      </p:sp>
+      <p:pic>
+        <p:nvPicPr>
+          <p:cNvPr id="9" name="Picture 8"/>
+          <p:cNvPicPr>
+            <a:picLocks noChangeAspect="1"/>
+          </p:cNvPicPr>
+          <p:nvPr/>
+        </p:nvPicPr>
+        <p:blipFill>
+          <a:blip r:embed="rId2">
+            <a:extLst>
+              <a:ext uri="{BEBA8EAE-BF5A-486C-A8C5-ECC9F3942E4B}">
+                <a14:imgProps xmlns:a14="http://schemas.microsoft.com/office/drawing/2010/main">
+                  <a14:imgLayer r:embed="rId3">
+                    <a14:imgEffect>
+                      <a14:backgroundRemoval t="1193" b="96380" l="2262" r="100000">
+                        <a14:foregroundMark x1="19762" y1="53492" x2="18095" y2="60945"/>
+                        <a14:foregroundMark x1="36310" y1="54259" x2="36310" y2="67334"/>
+                        <a14:foregroundMark x1="66667" y1="60945" x2="66667" y2="70741"/>
+                        <a14:foregroundMark x1="79643" y1="53790" x2="83333" y2="60945"/>
+                        <a14:foregroundMark x1="67500" y1="53194" x2="64167" y2="53194"/>
+                        <a14:foregroundMark x1="45476" y1="35051" x2="52976" y2="35349"/>
+                        <a14:foregroundMark x1="36310" y1="45017" x2="65000" y2="45315"/>
+                      </a14:backgroundRemoval>
+                    </a14:imgEffect>
+                  </a14:imgLayer>
+                </a14:imgProps>
+              </a:ext>
+            </a:extLst>
+          </a:blip>
+          <a:stretch>
+            <a:fillRect/>
+          </a:stretch>
+        </p:blipFill>
+        <p:spPr>
+          <a:xfrm>
+            <a:off x="1578574" y="919671"/>
+            <a:ext cx="760322" cy="2125281"/>
+          </a:xfrm>
+          <a:prstGeom prst="rect">
+            <a:avLst/>
+          </a:prstGeom>
+        </p:spPr>
+      </p:pic>
+      <p:pic>
+        <p:nvPicPr>
+          <p:cNvPr id="10" name="Picture 9"/>
+          <p:cNvPicPr>
+            <a:picLocks noChangeAspect="1"/>
+          </p:cNvPicPr>
+          <p:nvPr/>
+        </p:nvPicPr>
+        <p:blipFill rotWithShape="1">
+          <a:blip r:embed="rId4">
+            <a:extLst>
+              <a:ext uri="{BEBA8EAE-BF5A-486C-A8C5-ECC9F3942E4B}">
+                <a14:imgProps xmlns:a14="http://schemas.microsoft.com/office/drawing/2010/main">
+                  <a14:imgLayer r:embed="rId5">
+                    <a14:imgEffect>
+                      <a14:backgroundRemoval t="34667" b="75000" l="26560" r="49440">
+                        <a14:foregroundMark x1="36320" y1="37333" x2="39040" y2="39333"/>
+                        <a14:foregroundMark x1="42400" y1="42000" x2="44800" y2="47000"/>
+                        <a14:foregroundMark x1="33440" y1="47667" x2="36480" y2="55000"/>
+                        <a14:foregroundMark x1="33280" y1="63333" x2="43680" y2="64000"/>
+                        <a14:foregroundMark x1="27040" y1="63333" x2="29280" y2="70333"/>
+                        <a14:foregroundMark x1="45120" y1="71000" x2="48160" y2="64333"/>
+                        <a14:foregroundMark x1="47360" y1="67667" x2="46400" y2="70000"/>
+                        <a14:foregroundMark x1="31200" y1="39667" x2="35840" y2="36000"/>
+                        <a14:foregroundMark x1="36960" y1="36000" x2="40480" y2="35667"/>
+                        <a14:foregroundMark x1="41280" y1="36333" x2="45120" y2="39667"/>
+                      </a14:backgroundRemoval>
+                    </a14:imgEffect>
+                  </a14:imgLayer>
+                </a14:imgProps>
+              </a:ext>
+            </a:extLst>
+          </a:blip>
+          <a:srcRect l="26089" t="33360" r="49796" b="23760"/>
+          <a:stretch/>
+        </p:blipFill>
+        <p:spPr>
+          <a:xfrm>
+            <a:off x="4215924" y="1069583"/>
+            <a:ext cx="1499616" cy="1279927"/>
+          </a:xfrm>
+          <a:prstGeom prst="rect">
+            <a:avLst/>
+          </a:prstGeom>
+          <a:ln w="6350">
+            <a:solidFill>
+              <a:schemeClr val="tx1">
+                <a:lumMod val="75000"/>
+                <a:lumOff val="25000"/>
+              </a:schemeClr>
+            </a:solidFill>
+          </a:ln>
+        </p:spPr>
+      </p:pic>
+      <p:pic>
+        <p:nvPicPr>
+          <p:cNvPr id="1024" name="Picture 1023"/>
+          <p:cNvPicPr>
+            <a:picLocks noChangeAspect="1"/>
+          </p:cNvPicPr>
+          <p:nvPr/>
+        </p:nvPicPr>
+        <p:blipFill rotWithShape="1">
+          <a:blip r:embed="rId6">
+            <a:extLst>
+              <a:ext uri="{BEBA8EAE-BF5A-486C-A8C5-ECC9F3942E4B}">
+                <a14:imgProps xmlns:a14="http://schemas.microsoft.com/office/drawing/2010/main">
+                  <a14:imgLayer r:embed="rId7">
+                    <a14:imgEffect>
+                      <a14:backgroundRemoval t="10000" b="90000" l="10000" r="90000">
+                        <a14:backgroundMark x1="18611" y1="25278" x2="33333" y2="12500"/>
+                      </a14:backgroundRemoval>
+                    </a14:imgEffect>
+                  </a14:imgLayer>
+                </a14:imgProps>
+              </a:ext>
+            </a:extLst>
+          </a:blip>
+          <a:srcRect l="14022" t="10764" r="12517" b="15775"/>
+          <a:stretch/>
+        </p:blipFill>
+        <p:spPr>
+          <a:xfrm>
+            <a:off x="8784876" y="1163922"/>
+            <a:ext cx="1636776" cy="1636777"/>
+          </a:xfrm>
+          <a:prstGeom prst="rect">
+            <a:avLst/>
+          </a:prstGeom>
+        </p:spPr>
+      </p:pic>
+    </p:spTree>
+    <p:extLst>
+      <p:ext uri="{BB962C8B-B14F-4D97-AF65-F5344CB8AC3E}">
+        <p14:creationId xmlns:p14="http://schemas.microsoft.com/office/powerpoint/2010/main" val="2881240178"/>
+      </p:ext>
+    </p:extLst>
+  </p:cSld>
+  <p:clrMapOvr>
+    <a:masterClrMapping/>
+  </p:clrMapOvr>
+  <p:timing>
+    <p:tnLst>
+      <p:par>
+        <p:cTn id="1" dur="indefinite" restart="never" nodeType="tmRoot"/>
+      </p:par>
+    </p:tnLst>
+  </p:timing>
+</p:sld>
+</file>
+
+<file path=ppt/slides/slide3.xml><?xml version="1.0" encoding="utf-8"?>
+<p:sld xmlns:a="http://schemas.openxmlformats.org/drawingml/2006/main" xmlns:r="http://schemas.openxmlformats.org/officeDocument/2006/relationships" xmlns:p="http://schemas.openxmlformats.org/presentationml/2006/main">
+  <p:cSld>
+    <p:spTree>
+      <p:nvGrpSpPr>
+        <p:cNvPr id="1" name=""/>
+        <p:cNvGrpSpPr/>
+        <p:nvPr/>
+      </p:nvGrpSpPr>
+      <p:grpSpPr>
+        <a:xfrm>
+          <a:off x="0" y="0"/>
+          <a:ext cx="0" cy="0"/>
+          <a:chOff x="0" y="0"/>
+          <a:chExt cx="0" cy="0"/>
+        </a:xfrm>
+      </p:grpSpPr>
+      <p:sp>
+        <p:nvSpPr>
+          <p:cNvPr id="2" name="Title 1"/>
+          <p:cNvSpPr>
+            <a:spLocks noGrp="1"/>
+          </p:cNvSpPr>
+          <p:nvPr>
+            <p:ph type="title"/>
+          </p:nvPr>
+        </p:nvSpPr>
+        <p:spPr>
+          <a:xfrm>
+            <a:off x="838200" y="365125"/>
+            <a:ext cx="10515600" cy="448691"/>
+          </a:xfrm>
+        </p:spPr>
+        <p:txBody>
+          <a:bodyPr>
+            <a:noAutofit/>
+          </a:bodyPr>
+          <a:lstStyle/>
+          <a:p>
+            <a:r>
+              <a:rPr lang="en-US" sz="3600" dirty="0" smtClean="0"/>
+              <a:t>AI vs Doctors</a:t>
+            </a:r>
+            <a:endParaRPr lang="en-US" sz="3600" dirty="0"/>
+          </a:p>
+        </p:txBody>
+      </p:sp>
+      <p:sp>
+        <p:nvSpPr>
+          <p:cNvPr id="3" name="Content Placeholder 2"/>
+          <p:cNvSpPr>
+            <a:spLocks noGrp="1"/>
+          </p:cNvSpPr>
+          <p:nvPr>
+            <p:ph idx="1"/>
+          </p:nvPr>
+        </p:nvSpPr>
+        <p:spPr>
+          <a:xfrm>
+            <a:off x="838200" y="1825624"/>
+            <a:ext cx="10515600" cy="4730623"/>
+          </a:xfrm>
+        </p:spPr>
+        <p:txBody>
+          <a:bodyPr/>
+          <a:lstStyle/>
+          <a:p>
+            <a:r>
+              <a:rPr lang="en-US" dirty="0" smtClean="0"/>
+              <a:t>1x             +          1x                                      =  1x       </a:t>
+            </a:r>
+            <a:endParaRPr lang="en-US" dirty="0" smtClean="0"/>
+          </a:p>
+          <a:p>
+            <a:endParaRPr lang="en-US" dirty="0" smtClean="0"/>
+          </a:p>
+          <a:p>
+            <a:endParaRPr lang="en-US" dirty="0"/>
+          </a:p>
+          <a:p>
+            <a:endParaRPr lang="en-US" dirty="0" smtClean="0"/>
+          </a:p>
+          <a:p>
+            <a:r>
+              <a:rPr lang="en-US" dirty="0" smtClean="0"/>
+              <a:t>1x              + 10000x                                     = 10000x</a:t>
+            </a:r>
+            <a:endParaRPr lang="en-US" dirty="0" smtClean="0"/>
+          </a:p>
+          <a:p>
+            <a:endParaRPr lang="en-US" dirty="0"/>
+          </a:p>
+          <a:p>
+            <a:endParaRPr lang="en-US" dirty="0" smtClean="0"/>
+          </a:p>
+          <a:p>
+            <a:endParaRPr lang="en-US" dirty="0" smtClean="0"/>
+          </a:p>
+        </p:txBody>
+      </p:sp>
+      <p:pic>
+        <p:nvPicPr>
+          <p:cNvPr id="9" name="Picture 8"/>
+          <p:cNvPicPr>
+            <a:picLocks noChangeAspect="1"/>
+          </p:cNvPicPr>
+          <p:nvPr/>
+        </p:nvPicPr>
+        <p:blipFill>
+          <a:blip r:embed="rId2">
+            <a:extLst>
+              <a:ext uri="{BEBA8EAE-BF5A-486C-A8C5-ECC9F3942E4B}">
+                <a14:imgProps xmlns:a14="http://schemas.microsoft.com/office/drawing/2010/main">
+                  <a14:imgLayer r:embed="rId3">
+                    <a14:imgEffect>
+                      <a14:backgroundRemoval t="1193" b="96380" l="2262" r="100000">
+                        <a14:foregroundMark x1="19762" y1="53492" x2="18095" y2="60945"/>
+                        <a14:foregroundMark x1="36310" y1="54259" x2="36310" y2="67334"/>
+                        <a14:foregroundMark x1="66667" y1="60945" x2="66667" y2="70741"/>
+                        <a14:foregroundMark x1="79643" y1="53790" x2="83333" y2="60945"/>
+                        <a14:foregroundMark x1="67500" y1="53194" x2="64167" y2="53194"/>
+                        <a14:foregroundMark x1="45476" y1="35051" x2="52976" y2="35349"/>
+                        <a14:foregroundMark x1="36310" y1="45017" x2="65000" y2="45315"/>
+                      </a14:backgroundRemoval>
+                    </a14:imgEffect>
+                  </a14:imgLayer>
+                </a14:imgProps>
+              </a:ext>
+            </a:extLst>
+          </a:blip>
+          <a:stretch>
+            <a:fillRect/>
+          </a:stretch>
+        </p:blipFill>
+        <p:spPr>
+          <a:xfrm>
+            <a:off x="1578574" y="919671"/>
+            <a:ext cx="760322" cy="2125281"/>
+          </a:xfrm>
+          <a:prstGeom prst="rect">
+            <a:avLst/>
+          </a:prstGeom>
+        </p:spPr>
+      </p:pic>
+      <p:pic>
+        <p:nvPicPr>
+          <p:cNvPr id="10" name="Picture 9"/>
+          <p:cNvPicPr>
+            <a:picLocks noChangeAspect="1"/>
+          </p:cNvPicPr>
+          <p:nvPr/>
+        </p:nvPicPr>
+        <p:blipFill rotWithShape="1">
+          <a:blip r:embed="rId4">
+            <a:extLst>
+              <a:ext uri="{BEBA8EAE-BF5A-486C-A8C5-ECC9F3942E4B}">
+                <a14:imgProps xmlns:a14="http://schemas.microsoft.com/office/drawing/2010/main">
+                  <a14:imgLayer r:embed="rId5">
+                    <a14:imgEffect>
+                      <a14:backgroundRemoval t="34667" b="75000" l="26560" r="49440">
+                        <a14:foregroundMark x1="36320" y1="37333" x2="39040" y2="39333"/>
+                        <a14:foregroundMark x1="42400" y1="42000" x2="44800" y2="47000"/>
+                        <a14:foregroundMark x1="33440" y1="47667" x2="36480" y2="55000"/>
+                        <a14:foregroundMark x1="33280" y1="63333" x2="43680" y2="64000"/>
+                        <a14:foregroundMark x1="27040" y1="63333" x2="29280" y2="70333"/>
+                        <a14:foregroundMark x1="45120" y1="71000" x2="48160" y2="64333"/>
+                        <a14:foregroundMark x1="47360" y1="67667" x2="46400" y2="70000"/>
+                        <a14:foregroundMark x1="31200" y1="39667" x2="35840" y2="36000"/>
+                        <a14:foregroundMark x1="36960" y1="36000" x2="40480" y2="35667"/>
+                        <a14:foregroundMark x1="41280" y1="36333" x2="45120" y2="39667"/>
+                      </a14:backgroundRemoval>
+                    </a14:imgEffect>
+                  </a14:imgLayer>
+                </a14:imgProps>
+              </a:ext>
+            </a:extLst>
+          </a:blip>
+          <a:srcRect l="26089" t="33360" r="49796" b="23760"/>
+          <a:stretch/>
+        </p:blipFill>
+        <p:spPr>
+          <a:xfrm>
+            <a:off x="4215924" y="1069583"/>
+            <a:ext cx="1499616" cy="1279927"/>
+          </a:xfrm>
+          <a:prstGeom prst="rect">
+            <a:avLst/>
+          </a:prstGeom>
+          <a:ln w="6350">
+            <a:solidFill>
+              <a:schemeClr val="tx1">
+                <a:lumMod val="75000"/>
+                <a:lumOff val="25000"/>
+              </a:schemeClr>
+            </a:solidFill>
+          </a:ln>
+        </p:spPr>
+      </p:pic>
+      <p:pic>
+        <p:nvPicPr>
+          <p:cNvPr id="12" name="Picture 11"/>
+          <p:cNvPicPr>
+            <a:picLocks noChangeAspect="1"/>
+          </p:cNvPicPr>
+          <p:nvPr/>
+        </p:nvPicPr>
+        <p:blipFill>
+          <a:blip r:embed="rId2">
+            <a:extLst>
+              <a:ext uri="{BEBA8EAE-BF5A-486C-A8C5-ECC9F3942E4B}">
+                <a14:imgProps xmlns:a14="http://schemas.microsoft.com/office/drawing/2010/main">
+                  <a14:imgLayer r:embed="rId3">
+                    <a14:imgEffect>
+                      <a14:backgroundRemoval t="1193" b="96380" l="2262" r="100000">
+                        <a14:foregroundMark x1="19762" y1="53492" x2="18095" y2="60945"/>
+                        <a14:foregroundMark x1="36310" y1="54259" x2="36310" y2="67334"/>
+                        <a14:foregroundMark x1="66667" y1="60945" x2="66667" y2="70741"/>
+                        <a14:foregroundMark x1="79643" y1="53790" x2="83333" y2="60945"/>
+                        <a14:foregroundMark x1="67500" y1="53194" x2="64167" y2="53194"/>
+                        <a14:foregroundMark x1="45476" y1="35051" x2="52976" y2="35349"/>
+                        <a14:foregroundMark x1="36310" y1="45017" x2="65000" y2="45315"/>
+                      </a14:backgroundRemoval>
+                    </a14:imgEffect>
+                  </a14:imgLayer>
+                </a14:imgProps>
+              </a:ext>
+            </a:extLst>
+          </a:blip>
+          <a:stretch>
+            <a:fillRect/>
+          </a:stretch>
+        </p:blipFill>
+        <p:spPr>
+          <a:xfrm>
+            <a:off x="1578574" y="2994120"/>
+            <a:ext cx="760322" cy="2125281"/>
+          </a:xfrm>
+          <a:prstGeom prst="rect">
+            <a:avLst/>
+          </a:prstGeom>
+        </p:spPr>
+      </p:pic>
+      <p:grpSp>
+        <p:nvGrpSpPr>
+          <p:cNvPr id="11" name="Group 10"/>
+          <p:cNvGrpSpPr/>
+          <p:nvPr/>
+        </p:nvGrpSpPr>
+        <p:grpSpPr>
+          <a:xfrm>
+            <a:off x="4338384" y="2673328"/>
+            <a:ext cx="2261616" cy="2041927"/>
+            <a:chOff x="4356132" y="3126887"/>
+            <a:chExt cx="2261616" cy="2041927"/>
+          </a:xfrm>
+        </p:grpSpPr>
+        <p:pic>
+          <p:nvPicPr>
+            <p:cNvPr id="13" name="Picture 12"/>
+            <p:cNvPicPr>
+              <a:picLocks noChangeAspect="1"/>
+            </p:cNvPicPr>
+            <p:nvPr/>
+          </p:nvPicPr>
+          <p:blipFill rotWithShape="1">
+            <a:blip r:embed="rId4">
+              <a:extLst>
+                <a:ext uri="{BEBA8EAE-BF5A-486C-A8C5-ECC9F3942E4B}">
+                  <a14:imgProps xmlns:a14="http://schemas.microsoft.com/office/drawing/2010/main">
+                    <a14:imgLayer r:embed="rId5">
+                      <a14:imgEffect>
+                        <a14:backgroundRemoval t="34667" b="75000" l="26560" r="49440">
+                          <a14:foregroundMark x1="36320" y1="37333" x2="39040" y2="39333"/>
+                          <a14:foregroundMark x1="42400" y1="42000" x2="44800" y2="47000"/>
+                          <a14:foregroundMark x1="33440" y1="47667" x2="36480" y2="55000"/>
+                          <a14:foregroundMark x1="33280" y1="63333" x2="43680" y2="64000"/>
+                          <a14:foregroundMark x1="27040" y1="63333" x2="29280" y2="70333"/>
+                          <a14:foregroundMark x1="45120" y1="71000" x2="48160" y2="64333"/>
+                          <a14:foregroundMark x1="47360" y1="67667" x2="46400" y2="70000"/>
+                          <a14:foregroundMark x1="31200" y1="39667" x2="35840" y2="36000"/>
+                          <a14:foregroundMark x1="36960" y1="36000" x2="40480" y2="35667"/>
+                          <a14:foregroundMark x1="41280" y1="36333" x2="45120" y2="39667"/>
+                        </a14:backgroundRemoval>
+                      </a14:imgEffect>
+                    </a14:imgLayer>
+                  </a14:imgProps>
+                </a:ext>
+              </a:extLst>
+            </a:blip>
+            <a:srcRect l="26089" t="33360" r="49796" b="23760"/>
+            <a:stretch/>
+          </p:blipFill>
+          <p:spPr>
+            <a:xfrm>
+              <a:off x="4356132" y="3126887"/>
+              <a:ext cx="1499616" cy="1279927"/>
+            </a:xfrm>
+            <a:prstGeom prst="rect">
+              <a:avLst/>
+            </a:prstGeom>
+            <a:ln w="6350">
+              <a:solidFill>
+                <a:schemeClr val="tx1">
+                  <a:lumMod val="75000"/>
+                  <a:lumOff val="25000"/>
+                </a:schemeClr>
+              </a:solidFill>
+            </a:ln>
+          </p:spPr>
+        </p:pic>
+        <p:pic>
+          <p:nvPicPr>
+            <p:cNvPr id="19" name="Picture 18"/>
+            <p:cNvPicPr>
+              <a:picLocks noChangeAspect="1"/>
+            </p:cNvPicPr>
+            <p:nvPr/>
+          </p:nvPicPr>
+          <p:blipFill rotWithShape="1">
+            <a:blip r:embed="rId4">
+              <a:extLst>
+                <a:ext uri="{BEBA8EAE-BF5A-486C-A8C5-ECC9F3942E4B}">
+                  <a14:imgProps xmlns:a14="http://schemas.microsoft.com/office/drawing/2010/main">
+                    <a14:imgLayer r:embed="rId5">
+                      <a14:imgEffect>
+                        <a14:backgroundRemoval t="34667" b="75000" l="26560" r="49440">
+                          <a14:foregroundMark x1="36320" y1="37333" x2="39040" y2="39333"/>
+                          <a14:foregroundMark x1="42400" y1="42000" x2="44800" y2="47000"/>
+                          <a14:foregroundMark x1="33440" y1="47667" x2="36480" y2="55000"/>
+                          <a14:foregroundMark x1="33280" y1="63333" x2="43680" y2="64000"/>
+                          <a14:foregroundMark x1="27040" y1="63333" x2="29280" y2="70333"/>
+                          <a14:foregroundMark x1="45120" y1="71000" x2="48160" y2="64333"/>
+                          <a14:foregroundMark x1="47360" y1="67667" x2="46400" y2="70000"/>
+                          <a14:foregroundMark x1="31200" y1="39667" x2="35840" y2="36000"/>
+                          <a14:foregroundMark x1="36960" y1="36000" x2="40480" y2="35667"/>
+                          <a14:foregroundMark x1="41280" y1="36333" x2="45120" y2="39667"/>
+                        </a14:backgroundRemoval>
+                      </a14:imgEffect>
+                    </a14:imgLayer>
+                  </a14:imgProps>
+                </a:ext>
+              </a:extLst>
+            </a:blip>
+            <a:srcRect l="26089" t="33360" r="49796" b="23760"/>
+            <a:stretch/>
+          </p:blipFill>
+          <p:spPr>
+            <a:xfrm>
+              <a:off x="4508532" y="3279287"/>
+              <a:ext cx="1499616" cy="1279927"/>
+            </a:xfrm>
+            <a:prstGeom prst="rect">
+              <a:avLst/>
+            </a:prstGeom>
+            <a:ln w="6350">
+              <a:solidFill>
+                <a:schemeClr val="tx1">
+                  <a:lumMod val="75000"/>
+                  <a:lumOff val="25000"/>
+                </a:schemeClr>
+              </a:solidFill>
+            </a:ln>
+          </p:spPr>
+        </p:pic>
+        <p:pic>
+          <p:nvPicPr>
+            <p:cNvPr id="20" name="Picture 19"/>
+            <p:cNvPicPr>
+              <a:picLocks noChangeAspect="1"/>
+            </p:cNvPicPr>
+            <p:nvPr/>
+          </p:nvPicPr>
+          <p:blipFill rotWithShape="1">
+            <a:blip r:embed="rId4">
+              <a:extLst>
+                <a:ext uri="{BEBA8EAE-BF5A-486C-A8C5-ECC9F3942E4B}">
+                  <a14:imgProps xmlns:a14="http://schemas.microsoft.com/office/drawing/2010/main">
+                    <a14:imgLayer r:embed="rId5">
+                      <a14:imgEffect>
+                        <a14:backgroundRemoval t="34667" b="75000" l="26560" r="49440">
+                          <a14:foregroundMark x1="36320" y1="37333" x2="39040" y2="39333"/>
+                          <a14:foregroundMark x1="42400" y1="42000" x2="44800" y2="47000"/>
+                          <a14:foregroundMark x1="33440" y1="47667" x2="36480" y2="55000"/>
+                          <a14:foregroundMark x1="33280" y1="63333" x2="43680" y2="64000"/>
+                          <a14:foregroundMark x1="27040" y1="63333" x2="29280" y2="70333"/>
+                          <a14:foregroundMark x1="45120" y1="71000" x2="48160" y2="64333"/>
+                          <a14:foregroundMark x1="47360" y1="67667" x2="46400" y2="70000"/>
+                          <a14:foregroundMark x1="31200" y1="39667" x2="35840" y2="36000"/>
+                          <a14:foregroundMark x1="36960" y1="36000" x2="40480" y2="35667"/>
+                          <a14:foregroundMark x1="41280" y1="36333" x2="45120" y2="39667"/>
+                        </a14:backgroundRemoval>
+                      </a14:imgEffect>
+                    </a14:imgLayer>
+                  </a14:imgProps>
+                </a:ext>
+              </a:extLst>
+            </a:blip>
+            <a:srcRect l="26089" t="33360" r="49796" b="23760"/>
+            <a:stretch/>
+          </p:blipFill>
+          <p:spPr>
+            <a:xfrm>
+              <a:off x="4660932" y="3431687"/>
+              <a:ext cx="1499616" cy="1279927"/>
+            </a:xfrm>
+            <a:prstGeom prst="rect">
+              <a:avLst/>
+            </a:prstGeom>
+            <a:ln w="6350">
+              <a:solidFill>
+                <a:schemeClr val="tx1">
+                  <a:lumMod val="75000"/>
+                  <a:lumOff val="25000"/>
+                </a:schemeClr>
+              </a:solidFill>
+            </a:ln>
+          </p:spPr>
+        </p:pic>
+        <p:pic>
+          <p:nvPicPr>
+            <p:cNvPr id="21" name="Picture 20"/>
+            <p:cNvPicPr>
+              <a:picLocks noChangeAspect="1"/>
+            </p:cNvPicPr>
+            <p:nvPr/>
+          </p:nvPicPr>
+          <p:blipFill rotWithShape="1">
+            <a:blip r:embed="rId4">
+              <a:extLst>
+                <a:ext uri="{BEBA8EAE-BF5A-486C-A8C5-ECC9F3942E4B}">
+                  <a14:imgProps xmlns:a14="http://schemas.microsoft.com/office/drawing/2010/main">
+                    <a14:imgLayer r:embed="rId5">
+                      <a14:imgEffect>
+                        <a14:backgroundRemoval t="34667" b="75000" l="26560" r="49440">
+                          <a14:foregroundMark x1="36320" y1="37333" x2="39040" y2="39333"/>
+                          <a14:foregroundMark x1="42400" y1="42000" x2="44800" y2="47000"/>
+                          <a14:foregroundMark x1="33440" y1="47667" x2="36480" y2="55000"/>
+                          <a14:foregroundMark x1="33280" y1="63333" x2="43680" y2="64000"/>
+                          <a14:foregroundMark x1="27040" y1="63333" x2="29280" y2="70333"/>
+                          <a14:foregroundMark x1="45120" y1="71000" x2="48160" y2="64333"/>
+                          <a14:foregroundMark x1="47360" y1="67667" x2="46400" y2="70000"/>
+                          <a14:foregroundMark x1="31200" y1="39667" x2="35840" y2="36000"/>
+                          <a14:foregroundMark x1="36960" y1="36000" x2="40480" y2="35667"/>
+                          <a14:foregroundMark x1="41280" y1="36333" x2="45120" y2="39667"/>
+                        </a14:backgroundRemoval>
+                      </a14:imgEffect>
+                    </a14:imgLayer>
+                  </a14:imgProps>
+                </a:ext>
+              </a:extLst>
+            </a:blip>
+            <a:srcRect l="26089" t="33360" r="49796" b="23760"/>
+            <a:stretch/>
+          </p:blipFill>
+          <p:spPr>
+            <a:xfrm>
+              <a:off x="4813332" y="3584087"/>
+              <a:ext cx="1499616" cy="1279927"/>
+            </a:xfrm>
+            <a:prstGeom prst="rect">
+              <a:avLst/>
+            </a:prstGeom>
+            <a:ln w="6350">
+              <a:solidFill>
+                <a:schemeClr val="tx1">
+                  <a:lumMod val="75000"/>
+                  <a:lumOff val="25000"/>
+                </a:schemeClr>
+              </a:solidFill>
+            </a:ln>
+          </p:spPr>
+        </p:pic>
+        <p:pic>
+          <p:nvPicPr>
+            <p:cNvPr id="22" name="Picture 21"/>
+            <p:cNvPicPr>
+              <a:picLocks noChangeAspect="1"/>
+            </p:cNvPicPr>
+            <p:nvPr/>
+          </p:nvPicPr>
+          <p:blipFill rotWithShape="1">
+            <a:blip r:embed="rId4">
+              <a:extLst>
+                <a:ext uri="{BEBA8EAE-BF5A-486C-A8C5-ECC9F3942E4B}">
+                  <a14:imgProps xmlns:a14="http://schemas.microsoft.com/office/drawing/2010/main">
+                    <a14:imgLayer r:embed="rId5">
+                      <a14:imgEffect>
+                        <a14:backgroundRemoval t="34667" b="75000" l="26560" r="49440">
+                          <a14:foregroundMark x1="36320" y1="37333" x2="39040" y2="39333"/>
+                          <a14:foregroundMark x1="42400" y1="42000" x2="44800" y2="47000"/>
+                          <a14:foregroundMark x1="33440" y1="47667" x2="36480" y2="55000"/>
+                          <a14:foregroundMark x1="33280" y1="63333" x2="43680" y2="64000"/>
+                          <a14:foregroundMark x1="27040" y1="63333" x2="29280" y2="70333"/>
+                          <a14:foregroundMark x1="45120" y1="71000" x2="48160" y2="64333"/>
+                          <a14:foregroundMark x1="47360" y1="67667" x2="46400" y2="70000"/>
+                          <a14:foregroundMark x1="31200" y1="39667" x2="35840" y2="36000"/>
+                          <a14:foregroundMark x1="36960" y1="36000" x2="40480" y2="35667"/>
+                          <a14:foregroundMark x1="41280" y1="36333" x2="45120" y2="39667"/>
+                        </a14:backgroundRemoval>
+                      </a14:imgEffect>
+                    </a14:imgLayer>
+                  </a14:imgProps>
+                </a:ext>
+              </a:extLst>
+            </a:blip>
+            <a:srcRect l="26089" t="33360" r="49796" b="23760"/>
+            <a:stretch/>
+          </p:blipFill>
+          <p:spPr>
+            <a:xfrm>
+              <a:off x="4965732" y="3736487"/>
+              <a:ext cx="1499616" cy="1279927"/>
+            </a:xfrm>
+            <a:prstGeom prst="rect">
+              <a:avLst/>
+            </a:prstGeom>
+            <a:ln w="6350">
+              <a:solidFill>
+                <a:schemeClr val="tx1">
+                  <a:lumMod val="75000"/>
+                  <a:lumOff val="25000"/>
+                </a:schemeClr>
+              </a:solidFill>
+            </a:ln>
+          </p:spPr>
+        </p:pic>
+        <p:pic>
+          <p:nvPicPr>
+            <p:cNvPr id="23" name="Picture 22"/>
+            <p:cNvPicPr>
+              <a:picLocks noChangeAspect="1"/>
+            </p:cNvPicPr>
+            <p:nvPr/>
+          </p:nvPicPr>
+          <p:blipFill rotWithShape="1">
+            <a:blip r:embed="rId4">
+              <a:extLst>
+                <a:ext uri="{BEBA8EAE-BF5A-486C-A8C5-ECC9F3942E4B}">
+                  <a14:imgProps xmlns:a14="http://schemas.microsoft.com/office/drawing/2010/main">
+                    <a14:imgLayer r:embed="rId5">
+                      <a14:imgEffect>
+                        <a14:backgroundRemoval t="34667" b="75000" l="26560" r="49440">
+                          <a14:foregroundMark x1="36320" y1="37333" x2="39040" y2="39333"/>
+                          <a14:foregroundMark x1="42400" y1="42000" x2="44800" y2="47000"/>
+                          <a14:foregroundMark x1="33440" y1="47667" x2="36480" y2="55000"/>
+                          <a14:foregroundMark x1="33280" y1="63333" x2="43680" y2="64000"/>
+                          <a14:foregroundMark x1="27040" y1="63333" x2="29280" y2="70333"/>
+                          <a14:foregroundMark x1="45120" y1="71000" x2="48160" y2="64333"/>
+                          <a14:foregroundMark x1="47360" y1="67667" x2="46400" y2="70000"/>
+                          <a14:foregroundMark x1="31200" y1="39667" x2="35840" y2="36000"/>
+                          <a14:foregroundMark x1="36960" y1="36000" x2="40480" y2="35667"/>
+                          <a14:foregroundMark x1="41280" y1="36333" x2="45120" y2="39667"/>
+                        </a14:backgroundRemoval>
+                      </a14:imgEffect>
+                    </a14:imgLayer>
+                  </a14:imgProps>
+                </a:ext>
+              </a:extLst>
+            </a:blip>
+            <a:srcRect l="26089" t="33360" r="49796" b="23760"/>
+            <a:stretch/>
+          </p:blipFill>
+          <p:spPr>
+            <a:xfrm>
+              <a:off x="5118132" y="3888887"/>
+              <a:ext cx="1499616" cy="1279927"/>
+            </a:xfrm>
+            <a:prstGeom prst="rect">
+              <a:avLst/>
+            </a:prstGeom>
+            <a:ln w="6350">
+              <a:solidFill>
+                <a:schemeClr val="tx1">
+                  <a:lumMod val="75000"/>
+                  <a:lumOff val="25000"/>
+                </a:schemeClr>
+              </a:solidFill>
+            </a:ln>
+          </p:spPr>
+        </p:pic>
+      </p:grpSp>
+      <p:pic>
+        <p:nvPicPr>
+          <p:cNvPr id="1024" name="Picture 1023"/>
+          <p:cNvPicPr>
+            <a:picLocks noChangeAspect="1"/>
+          </p:cNvPicPr>
+          <p:nvPr/>
+        </p:nvPicPr>
+        <p:blipFill rotWithShape="1">
+          <a:blip r:embed="rId6">
+            <a:extLst>
+              <a:ext uri="{BEBA8EAE-BF5A-486C-A8C5-ECC9F3942E4B}">
+                <a14:imgProps xmlns:a14="http://schemas.microsoft.com/office/drawing/2010/main">
+                  <a14:imgLayer r:embed="rId7">
+                    <a14:imgEffect>
+                      <a14:backgroundRemoval t="10000" b="90000" l="10000" r="90000">
+                        <a14:backgroundMark x1="18611" y1="25278" x2="33333" y2="12500"/>
+                      </a14:backgroundRemoval>
+                    </a14:imgEffect>
+                  </a14:imgLayer>
+                </a14:imgProps>
+              </a:ext>
+            </a:extLst>
+          </a:blip>
+          <a:srcRect l="14022" t="10764" r="12517" b="15775"/>
+          <a:stretch/>
+        </p:blipFill>
+        <p:spPr>
+          <a:xfrm>
+            <a:off x="8784876" y="1163922"/>
+            <a:ext cx="1636776" cy="1636777"/>
+          </a:xfrm>
+          <a:prstGeom prst="rect">
+            <a:avLst/>
+          </a:prstGeom>
+        </p:spPr>
+      </p:pic>
+      <p:grpSp>
+        <p:nvGrpSpPr>
+          <p:cNvPr id="4" name="Group 3"/>
+          <p:cNvGrpSpPr/>
+          <p:nvPr/>
+        </p:nvGrpSpPr>
+        <p:grpSpPr>
+          <a:xfrm>
+            <a:off x="8390700" y="2863891"/>
+            <a:ext cx="2246376" cy="2246377"/>
+            <a:chOff x="8390700" y="2863891"/>
+            <a:chExt cx="2246376" cy="2246377"/>
+          </a:xfrm>
+        </p:grpSpPr>
+        <p:pic>
+          <p:nvPicPr>
+            <p:cNvPr id="34" name="Picture 33"/>
+            <p:cNvPicPr>
+              <a:picLocks noChangeAspect="1"/>
+            </p:cNvPicPr>
+            <p:nvPr/>
+          </p:nvPicPr>
+          <p:blipFill rotWithShape="1">
+            <a:blip r:embed="rId6">
+              <a:extLst>
+                <a:ext uri="{BEBA8EAE-BF5A-486C-A8C5-ECC9F3942E4B}">
+                  <a14:imgProps xmlns:a14="http://schemas.microsoft.com/office/drawing/2010/main">
+                    <a14:imgLayer r:embed="rId7">
+                      <a14:imgEffect>
+                        <a14:backgroundRemoval t="10000" b="90000" l="10000" r="90000">
+                          <a14:backgroundMark x1="18611" y1="25278" x2="33333" y2="12500"/>
+                        </a14:backgroundRemoval>
+                      </a14:imgEffect>
+                    </a14:imgLayer>
+                  </a14:imgProps>
+                </a:ext>
+              </a:extLst>
+            </a:blip>
+            <a:srcRect l="14022" t="10764" r="12517" b="15775"/>
+            <a:stretch/>
+          </p:blipFill>
+          <p:spPr>
+            <a:xfrm>
+              <a:off x="8390700" y="2863891"/>
+              <a:ext cx="1636776" cy="1636777"/>
+            </a:xfrm>
+            <a:prstGeom prst="rect">
+              <a:avLst/>
+            </a:prstGeom>
+          </p:spPr>
+        </p:pic>
+        <p:pic>
+          <p:nvPicPr>
+            <p:cNvPr id="36" name="Picture 35"/>
+            <p:cNvPicPr>
+              <a:picLocks noChangeAspect="1"/>
+            </p:cNvPicPr>
+            <p:nvPr/>
+          </p:nvPicPr>
+          <p:blipFill rotWithShape="1">
+            <a:blip r:embed="rId6">
+              <a:extLst>
+                <a:ext uri="{BEBA8EAE-BF5A-486C-A8C5-ECC9F3942E4B}">
+                  <a14:imgProps xmlns:a14="http://schemas.microsoft.com/office/drawing/2010/main">
+                    <a14:imgLayer r:embed="rId7">
+                      <a14:imgEffect>
+                        <a14:backgroundRemoval t="10000" b="90000" l="10000" r="90000">
+                          <a14:backgroundMark x1="18611" y1="25278" x2="33333" y2="12500"/>
+                        </a14:backgroundRemoval>
+                      </a14:imgEffect>
+                    </a14:imgLayer>
+                  </a14:imgProps>
+                </a:ext>
+              </a:extLst>
+            </a:blip>
+            <a:srcRect l="14022" t="10764" r="12517" b="15775"/>
+            <a:stretch/>
+          </p:blipFill>
+          <p:spPr>
+            <a:xfrm>
+              <a:off x="8543100" y="3016291"/>
+              <a:ext cx="1636776" cy="1636777"/>
+            </a:xfrm>
+            <a:prstGeom prst="rect">
+              <a:avLst/>
+            </a:prstGeom>
+          </p:spPr>
+        </p:pic>
+        <p:pic>
+          <p:nvPicPr>
+            <p:cNvPr id="37" name="Picture 36"/>
+            <p:cNvPicPr>
+              <a:picLocks noChangeAspect="1"/>
+            </p:cNvPicPr>
+            <p:nvPr/>
+          </p:nvPicPr>
+          <p:blipFill rotWithShape="1">
+            <a:blip r:embed="rId6">
+              <a:extLst>
+                <a:ext uri="{BEBA8EAE-BF5A-486C-A8C5-ECC9F3942E4B}">
+                  <a14:imgProps xmlns:a14="http://schemas.microsoft.com/office/drawing/2010/main">
+                    <a14:imgLayer r:embed="rId7">
+                      <a14:imgEffect>
+                        <a14:backgroundRemoval t="10000" b="90000" l="10000" r="90000">
+                          <a14:backgroundMark x1="18611" y1="25278" x2="33333" y2="12500"/>
+                        </a14:backgroundRemoval>
+                      </a14:imgEffect>
+                    </a14:imgLayer>
+                  </a14:imgProps>
+                </a:ext>
+              </a:extLst>
+            </a:blip>
+            <a:srcRect l="14022" t="10764" r="12517" b="15775"/>
+            <a:stretch/>
+          </p:blipFill>
+          <p:spPr>
+            <a:xfrm>
+              <a:off x="8695500" y="3168691"/>
+              <a:ext cx="1636776" cy="1636777"/>
+            </a:xfrm>
+            <a:prstGeom prst="rect">
+              <a:avLst/>
+            </a:prstGeom>
+          </p:spPr>
+        </p:pic>
+        <p:pic>
+          <p:nvPicPr>
+            <p:cNvPr id="38" name="Picture 37"/>
+            <p:cNvPicPr>
+              <a:picLocks noChangeAspect="1"/>
+            </p:cNvPicPr>
+            <p:nvPr/>
+          </p:nvPicPr>
+          <p:blipFill rotWithShape="1">
+            <a:blip r:embed="rId6">
+              <a:extLst>
+                <a:ext uri="{BEBA8EAE-BF5A-486C-A8C5-ECC9F3942E4B}">
+                  <a14:imgProps xmlns:a14="http://schemas.microsoft.com/office/drawing/2010/main">
+                    <a14:imgLayer r:embed="rId7">
+                      <a14:imgEffect>
+                        <a14:backgroundRemoval t="10000" b="90000" l="10000" r="90000">
+                          <a14:backgroundMark x1="18611" y1="25278" x2="33333" y2="12500"/>
+                        </a14:backgroundRemoval>
+                      </a14:imgEffect>
+                    </a14:imgLayer>
+                  </a14:imgProps>
+                </a:ext>
+              </a:extLst>
+            </a:blip>
+            <a:srcRect l="14022" t="10764" r="12517" b="15775"/>
+            <a:stretch/>
+          </p:blipFill>
+          <p:spPr>
+            <a:xfrm>
+              <a:off x="8847900" y="3321091"/>
+              <a:ext cx="1636776" cy="1636777"/>
+            </a:xfrm>
+            <a:prstGeom prst="rect">
+              <a:avLst/>
+            </a:prstGeom>
+          </p:spPr>
+        </p:pic>
+        <p:pic>
+          <p:nvPicPr>
+            <p:cNvPr id="39" name="Picture 38"/>
+            <p:cNvPicPr>
+              <a:picLocks noChangeAspect="1"/>
+            </p:cNvPicPr>
+            <p:nvPr/>
+          </p:nvPicPr>
+          <p:blipFill rotWithShape="1">
+            <a:blip r:embed="rId6">
+              <a:extLst>
+                <a:ext uri="{BEBA8EAE-BF5A-486C-A8C5-ECC9F3942E4B}">
+                  <a14:imgProps xmlns:a14="http://schemas.microsoft.com/office/drawing/2010/main">
+                    <a14:imgLayer r:embed="rId7">
+                      <a14:imgEffect>
+                        <a14:backgroundRemoval t="10000" b="90000" l="10000" r="90000">
+                          <a14:backgroundMark x1="18611" y1="25278" x2="33333" y2="12500"/>
+                        </a14:backgroundRemoval>
+                      </a14:imgEffect>
+                    </a14:imgLayer>
+                  </a14:imgProps>
+                </a:ext>
+              </a:extLst>
+            </a:blip>
+            <a:srcRect l="14022" t="10764" r="12517" b="15775"/>
+            <a:stretch/>
+          </p:blipFill>
+          <p:spPr>
+            <a:xfrm>
+              <a:off x="9000300" y="3473491"/>
+              <a:ext cx="1636776" cy="1636777"/>
+            </a:xfrm>
+            <a:prstGeom prst="rect">
+              <a:avLst/>
+            </a:prstGeom>
+          </p:spPr>
+        </p:pic>
+      </p:grpSp>
+    </p:spTree>
+    <p:extLst>
+      <p:ext uri="{BB962C8B-B14F-4D97-AF65-F5344CB8AC3E}">
+        <p14:creationId xmlns:p14="http://schemas.microsoft.com/office/powerpoint/2010/main" val="4045124751"/>
+      </p:ext>
+    </p:extLst>
+  </p:cSld>
+  <p:clrMapOvr>
+    <a:masterClrMapping/>
+  </p:clrMapOvr>
+  <p:timing>
+    <p:tnLst>
+      <p:par>
+        <p:cTn id="1" dur="indefinite" restart="never" nodeType="tmRoot"/>
+      </p:par>
+    </p:tnLst>
+  </p:timing>
+</p:sld>
+</file>
+
+<file path=ppt/slides/slide4.xml><?xml version="1.0" encoding="utf-8"?>
+<p:sld xmlns:a="http://schemas.openxmlformats.org/drawingml/2006/main" xmlns:r="http://schemas.openxmlformats.org/officeDocument/2006/relationships" xmlns:p="http://schemas.openxmlformats.org/presentationml/2006/main">
+  <p:cSld>
+    <p:spTree>
+      <p:nvGrpSpPr>
+        <p:cNvPr id="1" name=""/>
+        <p:cNvGrpSpPr/>
+        <p:nvPr/>
+      </p:nvGrpSpPr>
+      <p:grpSpPr>
+        <a:xfrm>
+          <a:off x="0" y="0"/>
+          <a:ext cx="0" cy="0"/>
+          <a:chOff x="0" y="0"/>
+          <a:chExt cx="0" cy="0"/>
+        </a:xfrm>
+      </p:grpSpPr>
+      <p:sp>
+        <p:nvSpPr>
+          <p:cNvPr id="2" name="Title 1"/>
+          <p:cNvSpPr>
+            <a:spLocks noGrp="1"/>
+          </p:cNvSpPr>
+          <p:nvPr>
+            <p:ph type="title"/>
+          </p:nvPr>
+        </p:nvSpPr>
+        <p:spPr>
+          <a:xfrm>
+            <a:off x="838200" y="365125"/>
+            <a:ext cx="10515600" cy="448691"/>
+          </a:xfrm>
+        </p:spPr>
+        <p:txBody>
+          <a:bodyPr>
+            <a:noAutofit/>
+          </a:bodyPr>
+          <a:lstStyle/>
+          <a:p>
+            <a:r>
+              <a:rPr lang="en-US" sz="3600" dirty="0" smtClean="0"/>
+              <a:t>AI vs Doctors</a:t>
+            </a:r>
+            <a:endParaRPr lang="en-US" sz="3600" dirty="0"/>
+          </a:p>
+        </p:txBody>
+      </p:sp>
+      <p:sp>
+        <p:nvSpPr>
+          <p:cNvPr id="3" name="Content Placeholder 2"/>
+          <p:cNvSpPr>
+            <a:spLocks noGrp="1"/>
+          </p:cNvSpPr>
+          <p:nvPr>
+            <p:ph idx="1"/>
+          </p:nvPr>
+        </p:nvSpPr>
+        <p:spPr>
+          <a:xfrm>
+            <a:off x="838200" y="1825624"/>
+            <a:ext cx="10515600" cy="4730623"/>
+          </a:xfrm>
+        </p:spPr>
+        <p:txBody>
+          <a:bodyPr/>
+          <a:lstStyle/>
+          <a:p>
+            <a:r>
+              <a:rPr lang="en-US" dirty="0" smtClean="0"/>
+              <a:t>1x             +          1x                                      =  1x       </a:t>
+            </a:r>
+            <a:endParaRPr lang="en-US" dirty="0" smtClean="0"/>
+          </a:p>
+          <a:p>
+            <a:endParaRPr lang="en-US" dirty="0" smtClean="0"/>
+          </a:p>
+          <a:p>
+            <a:endParaRPr lang="en-US" dirty="0"/>
+          </a:p>
+          <a:p>
+            <a:endParaRPr lang="en-US" dirty="0" smtClean="0"/>
+          </a:p>
+          <a:p>
+            <a:r>
+              <a:rPr lang="en-US" dirty="0" smtClean="0"/>
+              <a:t>1x              + 10000x                                     = 10000x</a:t>
+            </a:r>
+            <a:endParaRPr lang="en-US" dirty="0" smtClean="0"/>
+          </a:p>
+          <a:p>
+            <a:endParaRPr lang="en-US" dirty="0"/>
+          </a:p>
+          <a:p>
+            <a:endParaRPr lang="en-US" dirty="0" smtClean="0"/>
+          </a:p>
+          <a:p>
+            <a:endParaRPr lang="en-US" dirty="0" smtClean="0"/>
+          </a:p>
+          <a:p>
+            <a:r>
+              <a:rPr lang="en-US" dirty="0" smtClean="0"/>
+              <a:t>1x                + </a:t>
+            </a:r>
+            <a:r>
+              <a:rPr lang="en-US" dirty="0"/>
+              <a:t>10000 </a:t>
+            </a:r>
+            <a:r>
+              <a:rPr lang="en-US" dirty="0" smtClean="0"/>
+              <a:t>                                       = 0.1x</a:t>
+            </a:r>
+            <a:endParaRPr lang="en-US" dirty="0"/>
+          </a:p>
+        </p:txBody>
+      </p:sp>
+      <p:pic>
+        <p:nvPicPr>
+          <p:cNvPr id="9" name="Picture 8"/>
+          <p:cNvPicPr>
+            <a:picLocks noChangeAspect="1"/>
+          </p:cNvPicPr>
+          <p:nvPr/>
+        </p:nvPicPr>
+        <p:blipFill>
+          <a:blip r:embed="rId2">
+            <a:extLst>
+              <a:ext uri="{BEBA8EAE-BF5A-486C-A8C5-ECC9F3942E4B}">
+                <a14:imgProps xmlns:a14="http://schemas.microsoft.com/office/drawing/2010/main">
+                  <a14:imgLayer r:embed="rId3">
+                    <a14:imgEffect>
+                      <a14:backgroundRemoval t="1193" b="96380" l="2262" r="100000">
+                        <a14:foregroundMark x1="19762" y1="53492" x2="18095" y2="60945"/>
+                        <a14:foregroundMark x1="36310" y1="54259" x2="36310" y2="67334"/>
+                        <a14:foregroundMark x1="66667" y1="60945" x2="66667" y2="70741"/>
+                        <a14:foregroundMark x1="79643" y1="53790" x2="83333" y2="60945"/>
+                        <a14:foregroundMark x1="67500" y1="53194" x2="64167" y2="53194"/>
+                        <a14:foregroundMark x1="45476" y1="35051" x2="52976" y2="35349"/>
+                        <a14:foregroundMark x1="36310" y1="45017" x2="65000" y2="45315"/>
+                      </a14:backgroundRemoval>
+                    </a14:imgEffect>
+                  </a14:imgLayer>
+                </a14:imgProps>
+              </a:ext>
+            </a:extLst>
+          </a:blip>
+          <a:stretch>
+            <a:fillRect/>
+          </a:stretch>
+        </p:blipFill>
+        <p:spPr>
+          <a:xfrm>
+            <a:off x="1578574" y="919671"/>
+            <a:ext cx="760322" cy="2125281"/>
+          </a:xfrm>
+          <a:prstGeom prst="rect">
+            <a:avLst/>
+          </a:prstGeom>
+        </p:spPr>
+      </p:pic>
+      <p:pic>
+        <p:nvPicPr>
+          <p:cNvPr id="10" name="Picture 9"/>
+          <p:cNvPicPr>
+            <a:picLocks noChangeAspect="1"/>
+          </p:cNvPicPr>
+          <p:nvPr/>
+        </p:nvPicPr>
+        <p:blipFill rotWithShape="1">
+          <a:blip r:embed="rId4">
+            <a:extLst>
+              <a:ext uri="{BEBA8EAE-BF5A-486C-A8C5-ECC9F3942E4B}">
+                <a14:imgProps xmlns:a14="http://schemas.microsoft.com/office/drawing/2010/main">
+                  <a14:imgLayer r:embed="rId5">
+                    <a14:imgEffect>
+                      <a14:backgroundRemoval t="34667" b="75000" l="26560" r="49440">
+                        <a14:foregroundMark x1="36320" y1="37333" x2="39040" y2="39333"/>
+                        <a14:foregroundMark x1="42400" y1="42000" x2="44800" y2="47000"/>
+                        <a14:foregroundMark x1="33440" y1="47667" x2="36480" y2="55000"/>
+                        <a14:foregroundMark x1="33280" y1="63333" x2="43680" y2="64000"/>
+                        <a14:foregroundMark x1="27040" y1="63333" x2="29280" y2="70333"/>
+                        <a14:foregroundMark x1="45120" y1="71000" x2="48160" y2="64333"/>
+                        <a14:foregroundMark x1="47360" y1="67667" x2="46400" y2="70000"/>
+                        <a14:foregroundMark x1="31200" y1="39667" x2="35840" y2="36000"/>
+                        <a14:foregroundMark x1="36960" y1="36000" x2="40480" y2="35667"/>
+                        <a14:foregroundMark x1="41280" y1="36333" x2="45120" y2="39667"/>
+                      </a14:backgroundRemoval>
+                    </a14:imgEffect>
+                  </a14:imgLayer>
+                </a14:imgProps>
+              </a:ext>
+            </a:extLst>
+          </a:blip>
+          <a:srcRect l="26089" t="33360" r="49796" b="23760"/>
+          <a:stretch/>
+        </p:blipFill>
+        <p:spPr>
+          <a:xfrm>
+            <a:off x="4215924" y="1069583"/>
+            <a:ext cx="1499616" cy="1279927"/>
+          </a:xfrm>
+          <a:prstGeom prst="rect">
+            <a:avLst/>
+          </a:prstGeom>
+          <a:ln w="6350">
+            <a:solidFill>
+              <a:schemeClr val="tx1">
+                <a:lumMod val="75000"/>
+                <a:lumOff val="25000"/>
+              </a:schemeClr>
+            </a:solidFill>
+          </a:ln>
+        </p:spPr>
+      </p:pic>
+      <p:pic>
+        <p:nvPicPr>
+          <p:cNvPr id="12" name="Picture 11"/>
+          <p:cNvPicPr>
+            <a:picLocks noChangeAspect="1"/>
+          </p:cNvPicPr>
+          <p:nvPr/>
+        </p:nvPicPr>
+        <p:blipFill>
+          <a:blip r:embed="rId2">
+            <a:extLst>
+              <a:ext uri="{BEBA8EAE-BF5A-486C-A8C5-ECC9F3942E4B}">
+                <a14:imgProps xmlns:a14="http://schemas.microsoft.com/office/drawing/2010/main">
+                  <a14:imgLayer r:embed="rId3">
+                    <a14:imgEffect>
+                      <a14:backgroundRemoval t="1193" b="96380" l="2262" r="100000">
+                        <a14:foregroundMark x1="19762" y1="53492" x2="18095" y2="60945"/>
+                        <a14:foregroundMark x1="36310" y1="54259" x2="36310" y2="67334"/>
+                        <a14:foregroundMark x1="66667" y1="60945" x2="66667" y2="70741"/>
+                        <a14:foregroundMark x1="79643" y1="53790" x2="83333" y2="60945"/>
+                        <a14:foregroundMark x1="67500" y1="53194" x2="64167" y2="53194"/>
+                        <a14:foregroundMark x1="45476" y1="35051" x2="52976" y2="35349"/>
+                        <a14:foregroundMark x1="36310" y1="45017" x2="65000" y2="45315"/>
+                      </a14:backgroundRemoval>
+                    </a14:imgEffect>
+                  </a14:imgLayer>
+                </a14:imgProps>
+              </a:ext>
+            </a:extLst>
+          </a:blip>
+          <a:stretch>
+            <a:fillRect/>
+          </a:stretch>
+        </p:blipFill>
+        <p:spPr>
+          <a:xfrm>
+            <a:off x="1578574" y="2994120"/>
+            <a:ext cx="760322" cy="2125281"/>
+          </a:xfrm>
+          <a:prstGeom prst="rect">
+            <a:avLst/>
+          </a:prstGeom>
+        </p:spPr>
+      </p:pic>
+      <p:grpSp>
+        <p:nvGrpSpPr>
+          <p:cNvPr id="11" name="Group 10"/>
+          <p:cNvGrpSpPr/>
+          <p:nvPr/>
+        </p:nvGrpSpPr>
+        <p:grpSpPr>
+          <a:xfrm>
+            <a:off x="4338384" y="2673328"/>
+            <a:ext cx="2261616" cy="2041927"/>
+            <a:chOff x="4356132" y="3126887"/>
+            <a:chExt cx="2261616" cy="2041927"/>
+          </a:xfrm>
+        </p:grpSpPr>
+        <p:pic>
+          <p:nvPicPr>
+            <p:cNvPr id="13" name="Picture 12"/>
+            <p:cNvPicPr>
+              <a:picLocks noChangeAspect="1"/>
+            </p:cNvPicPr>
+            <p:nvPr/>
+          </p:nvPicPr>
+          <p:blipFill rotWithShape="1">
+            <a:blip r:embed="rId4">
+              <a:extLst>
+                <a:ext uri="{BEBA8EAE-BF5A-486C-A8C5-ECC9F3942E4B}">
+                  <a14:imgProps xmlns:a14="http://schemas.microsoft.com/office/drawing/2010/main">
+                    <a14:imgLayer r:embed="rId5">
+                      <a14:imgEffect>
+                        <a14:backgroundRemoval t="34667" b="75000" l="26560" r="49440">
+                          <a14:foregroundMark x1="36320" y1="37333" x2="39040" y2="39333"/>
+                          <a14:foregroundMark x1="42400" y1="42000" x2="44800" y2="47000"/>
+                          <a14:foregroundMark x1="33440" y1="47667" x2="36480" y2="55000"/>
+                          <a14:foregroundMark x1="33280" y1="63333" x2="43680" y2="64000"/>
+                          <a14:foregroundMark x1="27040" y1="63333" x2="29280" y2="70333"/>
+                          <a14:foregroundMark x1="45120" y1="71000" x2="48160" y2="64333"/>
+                          <a14:foregroundMark x1="47360" y1="67667" x2="46400" y2="70000"/>
+                          <a14:foregroundMark x1="31200" y1="39667" x2="35840" y2="36000"/>
+                          <a14:foregroundMark x1="36960" y1="36000" x2="40480" y2="35667"/>
+                          <a14:foregroundMark x1="41280" y1="36333" x2="45120" y2="39667"/>
+                        </a14:backgroundRemoval>
+                      </a14:imgEffect>
+                    </a14:imgLayer>
+                  </a14:imgProps>
+                </a:ext>
+              </a:extLst>
+            </a:blip>
+            <a:srcRect l="26089" t="33360" r="49796" b="23760"/>
+            <a:stretch/>
+          </p:blipFill>
+          <p:spPr>
+            <a:xfrm>
+              <a:off x="4356132" y="3126887"/>
+              <a:ext cx="1499616" cy="1279927"/>
+            </a:xfrm>
+            <a:prstGeom prst="rect">
+              <a:avLst/>
+            </a:prstGeom>
+            <a:ln w="6350">
+              <a:solidFill>
+                <a:schemeClr val="tx1">
+                  <a:lumMod val="75000"/>
+                  <a:lumOff val="25000"/>
+                </a:schemeClr>
+              </a:solidFill>
+            </a:ln>
+          </p:spPr>
+        </p:pic>
+        <p:pic>
+          <p:nvPicPr>
+            <p:cNvPr id="19" name="Picture 18"/>
+            <p:cNvPicPr>
+              <a:picLocks noChangeAspect="1"/>
+            </p:cNvPicPr>
+            <p:nvPr/>
+          </p:nvPicPr>
+          <p:blipFill rotWithShape="1">
+            <a:blip r:embed="rId4">
+              <a:extLst>
+                <a:ext uri="{BEBA8EAE-BF5A-486C-A8C5-ECC9F3942E4B}">
+                  <a14:imgProps xmlns:a14="http://schemas.microsoft.com/office/drawing/2010/main">
+                    <a14:imgLayer r:embed="rId5">
+                      <a14:imgEffect>
+                        <a14:backgroundRemoval t="34667" b="75000" l="26560" r="49440">
+                          <a14:foregroundMark x1="36320" y1="37333" x2="39040" y2="39333"/>
+                          <a14:foregroundMark x1="42400" y1="42000" x2="44800" y2="47000"/>
+                          <a14:foregroundMark x1="33440" y1="47667" x2="36480" y2="55000"/>
+                          <a14:foregroundMark x1="33280" y1="63333" x2="43680" y2="64000"/>
+                          <a14:foregroundMark x1="27040" y1="63333" x2="29280" y2="70333"/>
+                          <a14:foregroundMark x1="45120" y1="71000" x2="48160" y2="64333"/>
+                          <a14:foregroundMark x1="47360" y1="67667" x2="46400" y2="70000"/>
+                          <a14:foregroundMark x1="31200" y1="39667" x2="35840" y2="36000"/>
+                          <a14:foregroundMark x1="36960" y1="36000" x2="40480" y2="35667"/>
+                          <a14:foregroundMark x1="41280" y1="36333" x2="45120" y2="39667"/>
+                        </a14:backgroundRemoval>
+                      </a14:imgEffect>
+                    </a14:imgLayer>
+                  </a14:imgProps>
+                </a:ext>
+              </a:extLst>
+            </a:blip>
+            <a:srcRect l="26089" t="33360" r="49796" b="23760"/>
+            <a:stretch/>
+          </p:blipFill>
+          <p:spPr>
+            <a:xfrm>
+              <a:off x="4508532" y="3279287"/>
+              <a:ext cx="1499616" cy="1279927"/>
+            </a:xfrm>
+            <a:prstGeom prst="rect">
+              <a:avLst/>
+            </a:prstGeom>
+            <a:ln w="6350">
+              <a:solidFill>
+                <a:schemeClr val="tx1">
+                  <a:lumMod val="75000"/>
+                  <a:lumOff val="25000"/>
+                </a:schemeClr>
+              </a:solidFill>
+            </a:ln>
+          </p:spPr>
+        </p:pic>
+        <p:pic>
+          <p:nvPicPr>
+            <p:cNvPr id="20" name="Picture 19"/>
+            <p:cNvPicPr>
+              <a:picLocks noChangeAspect="1"/>
+            </p:cNvPicPr>
+            <p:nvPr/>
+          </p:nvPicPr>
+          <p:blipFill rotWithShape="1">
+            <a:blip r:embed="rId4">
+              <a:extLst>
+                <a:ext uri="{BEBA8EAE-BF5A-486C-A8C5-ECC9F3942E4B}">
+                  <a14:imgProps xmlns:a14="http://schemas.microsoft.com/office/drawing/2010/main">
+                    <a14:imgLayer r:embed="rId5">
+                      <a14:imgEffect>
+                        <a14:backgroundRemoval t="34667" b="75000" l="26560" r="49440">
+                          <a14:foregroundMark x1="36320" y1="37333" x2="39040" y2="39333"/>
+                          <a14:foregroundMark x1="42400" y1="42000" x2="44800" y2="47000"/>
+                          <a14:foregroundMark x1="33440" y1="47667" x2="36480" y2="55000"/>
+                          <a14:foregroundMark x1="33280" y1="63333" x2="43680" y2="64000"/>
+                          <a14:foregroundMark x1="27040" y1="63333" x2="29280" y2="70333"/>
+                          <a14:foregroundMark x1="45120" y1="71000" x2="48160" y2="64333"/>
+                          <a14:foregroundMark x1="47360" y1="67667" x2="46400" y2="70000"/>
+                          <a14:foregroundMark x1="31200" y1="39667" x2="35840" y2="36000"/>
+                          <a14:foregroundMark x1="36960" y1="36000" x2="40480" y2="35667"/>
+                          <a14:foregroundMark x1="41280" y1="36333" x2="45120" y2="39667"/>
+                        </a14:backgroundRemoval>
+                      </a14:imgEffect>
+                    </a14:imgLayer>
+                  </a14:imgProps>
+                </a:ext>
+              </a:extLst>
+            </a:blip>
+            <a:srcRect l="26089" t="33360" r="49796" b="23760"/>
+            <a:stretch/>
+          </p:blipFill>
+          <p:spPr>
+            <a:xfrm>
+              <a:off x="4660932" y="3431687"/>
+              <a:ext cx="1499616" cy="1279927"/>
+            </a:xfrm>
+            <a:prstGeom prst="rect">
+              <a:avLst/>
+            </a:prstGeom>
+            <a:ln w="6350">
+              <a:solidFill>
+                <a:schemeClr val="tx1">
+                  <a:lumMod val="75000"/>
+                  <a:lumOff val="25000"/>
+                </a:schemeClr>
+              </a:solidFill>
+            </a:ln>
+          </p:spPr>
+        </p:pic>
+        <p:pic>
+          <p:nvPicPr>
+            <p:cNvPr id="21" name="Picture 20"/>
+            <p:cNvPicPr>
+              <a:picLocks noChangeAspect="1"/>
+            </p:cNvPicPr>
+            <p:nvPr/>
+          </p:nvPicPr>
+          <p:blipFill rotWithShape="1">
+            <a:blip r:embed="rId4">
+              <a:extLst>
+                <a:ext uri="{BEBA8EAE-BF5A-486C-A8C5-ECC9F3942E4B}">
+                  <a14:imgProps xmlns:a14="http://schemas.microsoft.com/office/drawing/2010/main">
+                    <a14:imgLayer r:embed="rId5">
+                      <a14:imgEffect>
+                        <a14:backgroundRemoval t="34667" b="75000" l="26560" r="49440">
+                          <a14:foregroundMark x1="36320" y1="37333" x2="39040" y2="39333"/>
+                          <a14:foregroundMark x1="42400" y1="42000" x2="44800" y2="47000"/>
+                          <a14:foregroundMark x1="33440" y1="47667" x2="36480" y2="55000"/>
+                          <a14:foregroundMark x1="33280" y1="63333" x2="43680" y2="64000"/>
+                          <a14:foregroundMark x1="27040" y1="63333" x2="29280" y2="70333"/>
+                          <a14:foregroundMark x1="45120" y1="71000" x2="48160" y2="64333"/>
+                          <a14:foregroundMark x1="47360" y1="67667" x2="46400" y2="70000"/>
+                          <a14:foregroundMark x1="31200" y1="39667" x2="35840" y2="36000"/>
+                          <a14:foregroundMark x1="36960" y1="36000" x2="40480" y2="35667"/>
+                          <a14:foregroundMark x1="41280" y1="36333" x2="45120" y2="39667"/>
+                        </a14:backgroundRemoval>
+                      </a14:imgEffect>
+                    </a14:imgLayer>
+                  </a14:imgProps>
+                </a:ext>
+              </a:extLst>
+            </a:blip>
+            <a:srcRect l="26089" t="33360" r="49796" b="23760"/>
+            <a:stretch/>
+          </p:blipFill>
+          <p:spPr>
+            <a:xfrm>
+              <a:off x="4813332" y="3584087"/>
+              <a:ext cx="1499616" cy="1279927"/>
+            </a:xfrm>
+            <a:prstGeom prst="rect">
+              <a:avLst/>
+            </a:prstGeom>
+            <a:ln w="6350">
+              <a:solidFill>
+                <a:schemeClr val="tx1">
+                  <a:lumMod val="75000"/>
+                  <a:lumOff val="25000"/>
+                </a:schemeClr>
+              </a:solidFill>
+            </a:ln>
+          </p:spPr>
+        </p:pic>
+        <p:pic>
+          <p:nvPicPr>
+            <p:cNvPr id="22" name="Picture 21"/>
+            <p:cNvPicPr>
+              <a:picLocks noChangeAspect="1"/>
+            </p:cNvPicPr>
+            <p:nvPr/>
+          </p:nvPicPr>
+          <p:blipFill rotWithShape="1">
+            <a:blip r:embed="rId4">
+              <a:extLst>
+                <a:ext uri="{BEBA8EAE-BF5A-486C-A8C5-ECC9F3942E4B}">
+                  <a14:imgProps xmlns:a14="http://schemas.microsoft.com/office/drawing/2010/main">
+                    <a14:imgLayer r:embed="rId5">
+                      <a14:imgEffect>
+                        <a14:backgroundRemoval t="34667" b="75000" l="26560" r="49440">
+                          <a14:foregroundMark x1="36320" y1="37333" x2="39040" y2="39333"/>
+                          <a14:foregroundMark x1="42400" y1="42000" x2="44800" y2="47000"/>
+                          <a14:foregroundMark x1="33440" y1="47667" x2="36480" y2="55000"/>
+                          <a14:foregroundMark x1="33280" y1="63333" x2="43680" y2="64000"/>
+                          <a14:foregroundMark x1="27040" y1="63333" x2="29280" y2="70333"/>
+                          <a14:foregroundMark x1="45120" y1="71000" x2="48160" y2="64333"/>
+                          <a14:foregroundMark x1="47360" y1="67667" x2="46400" y2="70000"/>
+                          <a14:foregroundMark x1="31200" y1="39667" x2="35840" y2="36000"/>
+                          <a14:foregroundMark x1="36960" y1="36000" x2="40480" y2="35667"/>
+                          <a14:foregroundMark x1="41280" y1="36333" x2="45120" y2="39667"/>
+                        </a14:backgroundRemoval>
+                      </a14:imgEffect>
+                    </a14:imgLayer>
+                  </a14:imgProps>
+                </a:ext>
+              </a:extLst>
+            </a:blip>
+            <a:srcRect l="26089" t="33360" r="49796" b="23760"/>
+            <a:stretch/>
+          </p:blipFill>
+          <p:spPr>
+            <a:xfrm>
+              <a:off x="4965732" y="3736487"/>
+              <a:ext cx="1499616" cy="1279927"/>
+            </a:xfrm>
+            <a:prstGeom prst="rect">
+              <a:avLst/>
+            </a:prstGeom>
+            <a:ln w="6350">
+              <a:solidFill>
+                <a:schemeClr val="tx1">
+                  <a:lumMod val="75000"/>
+                  <a:lumOff val="25000"/>
+                </a:schemeClr>
+              </a:solidFill>
+            </a:ln>
+          </p:spPr>
+        </p:pic>
+        <p:pic>
+          <p:nvPicPr>
+            <p:cNvPr id="23" name="Picture 22"/>
+            <p:cNvPicPr>
+              <a:picLocks noChangeAspect="1"/>
+            </p:cNvPicPr>
+            <p:nvPr/>
+          </p:nvPicPr>
+          <p:blipFill rotWithShape="1">
+            <a:blip r:embed="rId4">
+              <a:extLst>
+                <a:ext uri="{BEBA8EAE-BF5A-486C-A8C5-ECC9F3942E4B}">
+                  <a14:imgProps xmlns:a14="http://schemas.microsoft.com/office/drawing/2010/main">
+                    <a14:imgLayer r:embed="rId5">
+                      <a14:imgEffect>
+                        <a14:backgroundRemoval t="34667" b="75000" l="26560" r="49440">
+                          <a14:foregroundMark x1="36320" y1="37333" x2="39040" y2="39333"/>
+                          <a14:foregroundMark x1="42400" y1="42000" x2="44800" y2="47000"/>
+                          <a14:foregroundMark x1="33440" y1="47667" x2="36480" y2="55000"/>
+                          <a14:foregroundMark x1="33280" y1="63333" x2="43680" y2="64000"/>
+                          <a14:foregroundMark x1="27040" y1="63333" x2="29280" y2="70333"/>
+                          <a14:foregroundMark x1="45120" y1="71000" x2="48160" y2="64333"/>
+                          <a14:foregroundMark x1="47360" y1="67667" x2="46400" y2="70000"/>
+                          <a14:foregroundMark x1="31200" y1="39667" x2="35840" y2="36000"/>
+                          <a14:foregroundMark x1="36960" y1="36000" x2="40480" y2="35667"/>
+                          <a14:foregroundMark x1="41280" y1="36333" x2="45120" y2="39667"/>
+                        </a14:backgroundRemoval>
+                      </a14:imgEffect>
+                    </a14:imgLayer>
+                  </a14:imgProps>
+                </a:ext>
+              </a:extLst>
+            </a:blip>
+            <a:srcRect l="26089" t="33360" r="49796" b="23760"/>
+            <a:stretch/>
+          </p:blipFill>
+          <p:spPr>
+            <a:xfrm>
+              <a:off x="5118132" y="3888887"/>
+              <a:ext cx="1499616" cy="1279927"/>
+            </a:xfrm>
+            <a:prstGeom prst="rect">
+              <a:avLst/>
+            </a:prstGeom>
+            <a:ln w="6350">
+              <a:solidFill>
+                <a:schemeClr val="tx1">
+                  <a:lumMod val="75000"/>
+                  <a:lumOff val="25000"/>
+                </a:schemeClr>
+              </a:solidFill>
+            </a:ln>
+          </p:spPr>
+        </p:pic>
+      </p:grpSp>
+      <p:grpSp>
+        <p:nvGrpSpPr>
+          <p:cNvPr id="25" name="Group 24"/>
+          <p:cNvGrpSpPr/>
+          <p:nvPr/>
+        </p:nvGrpSpPr>
+        <p:grpSpPr>
+          <a:xfrm>
+            <a:off x="4356132" y="4753291"/>
+            <a:ext cx="2261616" cy="2041927"/>
+            <a:chOff x="4356132" y="3126887"/>
+            <a:chExt cx="2261616" cy="2041927"/>
+          </a:xfrm>
+        </p:grpSpPr>
+        <p:pic>
+          <p:nvPicPr>
+            <p:cNvPr id="26" name="Picture 25"/>
+            <p:cNvPicPr>
+              <a:picLocks noChangeAspect="1"/>
+            </p:cNvPicPr>
+            <p:nvPr/>
+          </p:nvPicPr>
+          <p:blipFill rotWithShape="1">
+            <a:blip r:embed="rId4">
+              <a:extLst>
+                <a:ext uri="{BEBA8EAE-BF5A-486C-A8C5-ECC9F3942E4B}">
+                  <a14:imgProps xmlns:a14="http://schemas.microsoft.com/office/drawing/2010/main">
+                    <a14:imgLayer r:embed="rId5">
+                      <a14:imgEffect>
+                        <a14:backgroundRemoval t="34667" b="75000" l="26560" r="49440">
+                          <a14:foregroundMark x1="36320" y1="37333" x2="39040" y2="39333"/>
+                          <a14:foregroundMark x1="42400" y1="42000" x2="44800" y2="47000"/>
+                          <a14:foregroundMark x1="33440" y1="47667" x2="36480" y2="55000"/>
+                          <a14:foregroundMark x1="33280" y1="63333" x2="43680" y2="64000"/>
+                          <a14:foregroundMark x1="27040" y1="63333" x2="29280" y2="70333"/>
+                          <a14:foregroundMark x1="45120" y1="71000" x2="48160" y2="64333"/>
+                          <a14:foregroundMark x1="47360" y1="67667" x2="46400" y2="70000"/>
+                          <a14:foregroundMark x1="31200" y1="39667" x2="35840" y2="36000"/>
+                          <a14:foregroundMark x1="36960" y1="36000" x2="40480" y2="35667"/>
+                          <a14:foregroundMark x1="41280" y1="36333" x2="45120" y2="39667"/>
+                        </a14:backgroundRemoval>
+                      </a14:imgEffect>
+                    </a14:imgLayer>
+                  </a14:imgProps>
+                </a:ext>
+              </a:extLst>
+            </a:blip>
+            <a:srcRect l="26089" t="33360" r="49796" b="23760"/>
+            <a:stretch/>
+          </p:blipFill>
+          <p:spPr>
+            <a:xfrm>
+              <a:off x="4356132" y="3126887"/>
+              <a:ext cx="1499616" cy="1279927"/>
+            </a:xfrm>
+            <a:prstGeom prst="rect">
+              <a:avLst/>
+            </a:prstGeom>
+            <a:ln w="6350">
+              <a:solidFill>
+                <a:schemeClr val="tx1">
+                  <a:lumMod val="75000"/>
+                  <a:lumOff val="25000"/>
+                </a:schemeClr>
+              </a:solidFill>
+            </a:ln>
+          </p:spPr>
+        </p:pic>
+        <p:pic>
+          <p:nvPicPr>
+            <p:cNvPr id="27" name="Picture 26"/>
+            <p:cNvPicPr>
+              <a:picLocks noChangeAspect="1"/>
+            </p:cNvPicPr>
+            <p:nvPr/>
+          </p:nvPicPr>
+          <p:blipFill rotWithShape="1">
+            <a:blip r:embed="rId4">
+              <a:extLst>
+                <a:ext uri="{BEBA8EAE-BF5A-486C-A8C5-ECC9F3942E4B}">
+                  <a14:imgProps xmlns:a14="http://schemas.microsoft.com/office/drawing/2010/main">
+                    <a14:imgLayer r:embed="rId5">
+                      <a14:imgEffect>
+                        <a14:backgroundRemoval t="34667" b="75000" l="26560" r="49440">
+                          <a14:foregroundMark x1="36320" y1="37333" x2="39040" y2="39333"/>
+                          <a14:foregroundMark x1="42400" y1="42000" x2="44800" y2="47000"/>
+                          <a14:foregroundMark x1="33440" y1="47667" x2="36480" y2="55000"/>
+                          <a14:foregroundMark x1="33280" y1="63333" x2="43680" y2="64000"/>
+                          <a14:foregroundMark x1="27040" y1="63333" x2="29280" y2="70333"/>
+                          <a14:foregroundMark x1="45120" y1="71000" x2="48160" y2="64333"/>
+                          <a14:foregroundMark x1="47360" y1="67667" x2="46400" y2="70000"/>
+                          <a14:foregroundMark x1="31200" y1="39667" x2="35840" y2="36000"/>
+                          <a14:foregroundMark x1="36960" y1="36000" x2="40480" y2="35667"/>
+                          <a14:foregroundMark x1="41280" y1="36333" x2="45120" y2="39667"/>
+                        </a14:backgroundRemoval>
+                      </a14:imgEffect>
+                    </a14:imgLayer>
+                  </a14:imgProps>
+                </a:ext>
+              </a:extLst>
+            </a:blip>
+            <a:srcRect l="26089" t="33360" r="49796" b="23760"/>
+            <a:stretch/>
+          </p:blipFill>
+          <p:spPr>
+            <a:xfrm>
+              <a:off x="4508532" y="3279287"/>
+              <a:ext cx="1499616" cy="1279927"/>
+            </a:xfrm>
+            <a:prstGeom prst="rect">
+              <a:avLst/>
+            </a:prstGeom>
+            <a:ln w="6350">
+              <a:solidFill>
+                <a:schemeClr val="tx1">
+                  <a:lumMod val="75000"/>
+                  <a:lumOff val="25000"/>
+                </a:schemeClr>
+              </a:solidFill>
+            </a:ln>
+          </p:spPr>
+        </p:pic>
+        <p:pic>
+          <p:nvPicPr>
+            <p:cNvPr id="28" name="Picture 27"/>
+            <p:cNvPicPr>
+              <a:picLocks noChangeAspect="1"/>
+            </p:cNvPicPr>
+            <p:nvPr/>
+          </p:nvPicPr>
+          <p:blipFill rotWithShape="1">
+            <a:blip r:embed="rId4">
+              <a:extLst>
+                <a:ext uri="{BEBA8EAE-BF5A-486C-A8C5-ECC9F3942E4B}">
+                  <a14:imgProps xmlns:a14="http://schemas.microsoft.com/office/drawing/2010/main">
+                    <a14:imgLayer r:embed="rId5">
+                      <a14:imgEffect>
+                        <a14:backgroundRemoval t="34667" b="75000" l="26560" r="49440">
+                          <a14:foregroundMark x1="36320" y1="37333" x2="39040" y2="39333"/>
+                          <a14:foregroundMark x1="42400" y1="42000" x2="44800" y2="47000"/>
+                          <a14:foregroundMark x1="33440" y1="47667" x2="36480" y2="55000"/>
+                          <a14:foregroundMark x1="33280" y1="63333" x2="43680" y2="64000"/>
+                          <a14:foregroundMark x1="27040" y1="63333" x2="29280" y2="70333"/>
+                          <a14:foregroundMark x1="45120" y1="71000" x2="48160" y2="64333"/>
+                          <a14:foregroundMark x1="47360" y1="67667" x2="46400" y2="70000"/>
+                          <a14:foregroundMark x1="31200" y1="39667" x2="35840" y2="36000"/>
+                          <a14:foregroundMark x1="36960" y1="36000" x2="40480" y2="35667"/>
+                          <a14:foregroundMark x1="41280" y1="36333" x2="45120" y2="39667"/>
+                        </a14:backgroundRemoval>
+                      </a14:imgEffect>
+                    </a14:imgLayer>
+                  </a14:imgProps>
+                </a:ext>
+              </a:extLst>
+            </a:blip>
+            <a:srcRect l="26089" t="33360" r="49796" b="23760"/>
+            <a:stretch/>
+          </p:blipFill>
+          <p:spPr>
+            <a:xfrm>
+              <a:off x="4660932" y="3431687"/>
+              <a:ext cx="1499616" cy="1279927"/>
+            </a:xfrm>
+            <a:prstGeom prst="rect">
+              <a:avLst/>
+            </a:prstGeom>
+            <a:ln w="6350">
+              <a:solidFill>
+                <a:schemeClr val="tx1">
+                  <a:lumMod val="75000"/>
+                  <a:lumOff val="25000"/>
+                </a:schemeClr>
+              </a:solidFill>
+            </a:ln>
+          </p:spPr>
+        </p:pic>
+        <p:pic>
+          <p:nvPicPr>
+            <p:cNvPr id="29" name="Picture 28"/>
+            <p:cNvPicPr>
+              <a:picLocks noChangeAspect="1"/>
+            </p:cNvPicPr>
+            <p:nvPr/>
+          </p:nvPicPr>
+          <p:blipFill rotWithShape="1">
+            <a:blip r:embed="rId4">
+              <a:extLst>
+                <a:ext uri="{BEBA8EAE-BF5A-486C-A8C5-ECC9F3942E4B}">
+                  <a14:imgProps xmlns:a14="http://schemas.microsoft.com/office/drawing/2010/main">
+                    <a14:imgLayer r:embed="rId5">
+                      <a14:imgEffect>
+                        <a14:backgroundRemoval t="34667" b="75000" l="26560" r="49440">
+                          <a14:foregroundMark x1="36320" y1="37333" x2="39040" y2="39333"/>
+                          <a14:foregroundMark x1="42400" y1="42000" x2="44800" y2="47000"/>
+                          <a14:foregroundMark x1="33440" y1="47667" x2="36480" y2="55000"/>
+                          <a14:foregroundMark x1="33280" y1="63333" x2="43680" y2="64000"/>
+                          <a14:foregroundMark x1="27040" y1="63333" x2="29280" y2="70333"/>
+                          <a14:foregroundMark x1="45120" y1="71000" x2="48160" y2="64333"/>
+                          <a14:foregroundMark x1="47360" y1="67667" x2="46400" y2="70000"/>
+                          <a14:foregroundMark x1="31200" y1="39667" x2="35840" y2="36000"/>
+                          <a14:foregroundMark x1="36960" y1="36000" x2="40480" y2="35667"/>
+                          <a14:foregroundMark x1="41280" y1="36333" x2="45120" y2="39667"/>
+                        </a14:backgroundRemoval>
+                      </a14:imgEffect>
+                    </a14:imgLayer>
+                  </a14:imgProps>
+                </a:ext>
+              </a:extLst>
+            </a:blip>
+            <a:srcRect l="26089" t="33360" r="49796" b="23760"/>
+            <a:stretch/>
+          </p:blipFill>
+          <p:spPr>
+            <a:xfrm>
+              <a:off x="4813332" y="3584087"/>
+              <a:ext cx="1499616" cy="1279927"/>
+            </a:xfrm>
+            <a:prstGeom prst="rect">
+              <a:avLst/>
+            </a:prstGeom>
+            <a:ln w="6350">
+              <a:solidFill>
+                <a:schemeClr val="tx1">
+                  <a:lumMod val="75000"/>
+                  <a:lumOff val="25000"/>
+                </a:schemeClr>
+              </a:solidFill>
+            </a:ln>
+          </p:spPr>
+        </p:pic>
+        <p:pic>
+          <p:nvPicPr>
+            <p:cNvPr id="30" name="Picture 29"/>
+            <p:cNvPicPr>
+              <a:picLocks noChangeAspect="1"/>
+            </p:cNvPicPr>
+            <p:nvPr/>
+          </p:nvPicPr>
+          <p:blipFill rotWithShape="1">
+            <a:blip r:embed="rId4">
+              <a:extLst>
+                <a:ext uri="{BEBA8EAE-BF5A-486C-A8C5-ECC9F3942E4B}">
+                  <a14:imgProps xmlns:a14="http://schemas.microsoft.com/office/drawing/2010/main">
+                    <a14:imgLayer r:embed="rId5">
+                      <a14:imgEffect>
+                        <a14:backgroundRemoval t="34667" b="75000" l="26560" r="49440">
+                          <a14:foregroundMark x1="36320" y1="37333" x2="39040" y2="39333"/>
+                          <a14:foregroundMark x1="42400" y1="42000" x2="44800" y2="47000"/>
+                          <a14:foregroundMark x1="33440" y1="47667" x2="36480" y2="55000"/>
+                          <a14:foregroundMark x1="33280" y1="63333" x2="43680" y2="64000"/>
+                          <a14:foregroundMark x1="27040" y1="63333" x2="29280" y2="70333"/>
+                          <a14:foregroundMark x1="45120" y1="71000" x2="48160" y2="64333"/>
+                          <a14:foregroundMark x1="47360" y1="67667" x2="46400" y2="70000"/>
+                          <a14:foregroundMark x1="31200" y1="39667" x2="35840" y2="36000"/>
+                          <a14:foregroundMark x1="36960" y1="36000" x2="40480" y2="35667"/>
+                          <a14:foregroundMark x1="41280" y1="36333" x2="45120" y2="39667"/>
+                        </a14:backgroundRemoval>
+                      </a14:imgEffect>
+                    </a14:imgLayer>
+                  </a14:imgProps>
+                </a:ext>
+              </a:extLst>
+            </a:blip>
+            <a:srcRect l="26089" t="33360" r="49796" b="23760"/>
+            <a:stretch/>
+          </p:blipFill>
+          <p:spPr>
+            <a:xfrm>
+              <a:off x="4965732" y="3736487"/>
+              <a:ext cx="1499616" cy="1279927"/>
+            </a:xfrm>
+            <a:prstGeom prst="rect">
+              <a:avLst/>
+            </a:prstGeom>
+            <a:ln w="6350">
+              <a:solidFill>
+                <a:schemeClr val="tx1">
+                  <a:lumMod val="75000"/>
+                  <a:lumOff val="25000"/>
+                </a:schemeClr>
+              </a:solidFill>
+            </a:ln>
+          </p:spPr>
+        </p:pic>
+        <p:pic>
+          <p:nvPicPr>
+            <p:cNvPr id="31" name="Picture 30"/>
+            <p:cNvPicPr>
+              <a:picLocks noChangeAspect="1"/>
+            </p:cNvPicPr>
+            <p:nvPr/>
+          </p:nvPicPr>
+          <p:blipFill rotWithShape="1">
+            <a:blip r:embed="rId4">
+              <a:extLst>
+                <a:ext uri="{BEBA8EAE-BF5A-486C-A8C5-ECC9F3942E4B}">
+                  <a14:imgProps xmlns:a14="http://schemas.microsoft.com/office/drawing/2010/main">
+                    <a14:imgLayer r:embed="rId5">
+                      <a14:imgEffect>
+                        <a14:backgroundRemoval t="34667" b="75000" l="26560" r="49440">
+                          <a14:foregroundMark x1="36320" y1="37333" x2="39040" y2="39333"/>
+                          <a14:foregroundMark x1="42400" y1="42000" x2="44800" y2="47000"/>
+                          <a14:foregroundMark x1="33440" y1="47667" x2="36480" y2="55000"/>
+                          <a14:foregroundMark x1="33280" y1="63333" x2="43680" y2="64000"/>
+                          <a14:foregroundMark x1="27040" y1="63333" x2="29280" y2="70333"/>
+                          <a14:foregroundMark x1="45120" y1="71000" x2="48160" y2="64333"/>
+                          <a14:foregroundMark x1="47360" y1="67667" x2="46400" y2="70000"/>
+                          <a14:foregroundMark x1="31200" y1="39667" x2="35840" y2="36000"/>
+                          <a14:foregroundMark x1="36960" y1="36000" x2="40480" y2="35667"/>
+                          <a14:foregroundMark x1="41280" y1="36333" x2="45120" y2="39667"/>
+                        </a14:backgroundRemoval>
+                      </a14:imgEffect>
+                    </a14:imgLayer>
+                  </a14:imgProps>
+                </a:ext>
+              </a:extLst>
+            </a:blip>
+            <a:srcRect l="26089" t="33360" r="49796" b="23760"/>
+            <a:stretch/>
+          </p:blipFill>
+          <p:spPr>
+            <a:xfrm>
+              <a:off x="5118132" y="3888887"/>
+              <a:ext cx="1499616" cy="1279927"/>
+            </a:xfrm>
+            <a:prstGeom prst="rect">
+              <a:avLst/>
+            </a:prstGeom>
+            <a:ln w="6350">
+              <a:solidFill>
+                <a:schemeClr val="tx1">
+                  <a:lumMod val="75000"/>
+                  <a:lumOff val="25000"/>
+                </a:schemeClr>
+              </a:solidFill>
+            </a:ln>
+          </p:spPr>
+        </p:pic>
+      </p:grpSp>
+      <p:pic>
+        <p:nvPicPr>
+          <p:cNvPr id="24" name="Picture 23"/>
+          <p:cNvPicPr>
+            <a:picLocks noChangeAspect="1"/>
+          </p:cNvPicPr>
+          <p:nvPr/>
+        </p:nvPicPr>
+        <p:blipFill>
+          <a:blip r:embed="rId6">
+            <a:extLst>
+              <a:ext uri="{BEBA8EAE-BF5A-486C-A8C5-ECC9F3942E4B}">
+                <a14:imgProps xmlns:a14="http://schemas.microsoft.com/office/drawing/2010/main">
+                  <a14:imgLayer r:embed="rId7">
+                    <a14:imgEffect>
+                      <a14:backgroundRemoval t="10000" b="93625" l="10000" r="90000">
+                        <a14:foregroundMark x1="46500" y1="16375" x2="62750" y2="17000"/>
+                        <a14:foregroundMark x1="42500" y1="20375" x2="55000" y2="34625"/>
+                        <a14:foregroundMark x1="49500" y1="20375" x2="59625" y2="26125"/>
+                        <a14:foregroundMark x1="59250" y1="21875" x2="59500" y2="33875"/>
+                        <a14:foregroundMark x1="42000" y1="26500" x2="41625" y2="34375"/>
+                        <a14:foregroundMark x1="45250" y1="30875" x2="47375" y2="33125"/>
+                        <a14:foregroundMark x1="44000" y1="30500" x2="50750" y2="34250"/>
+                        <a14:foregroundMark x1="56000" y1="30125" x2="55500" y2="31250"/>
+                        <a14:foregroundMark x1="32625" y1="48500" x2="28500" y2="55750"/>
+                        <a14:foregroundMark x1="39375" y1="54125" x2="44125" y2="64125"/>
+                        <a14:foregroundMark x1="43500" y1="69250" x2="38000" y2="82375"/>
+                        <a14:foregroundMark x1="53750" y1="72250" x2="55500" y2="73375"/>
+                        <a14:foregroundMark x1="55375" y1="82625" x2="55500" y2="85000"/>
+                        <a14:foregroundMark x1="66375" y1="47125" x2="66250" y2="48500"/>
+                        <a14:foregroundMark x1="70750" y1="52500" x2="70750" y2="54625"/>
+                        <a14:foregroundMark x1="38250" y1="58750" x2="38250" y2="59625"/>
+                        <a14:foregroundMark x1="43750" y1="56250" x2="44375" y2="58250"/>
+                      </a14:backgroundRemoval>
+                    </a14:imgEffect>
+                  </a14:imgLayer>
+                </a14:imgProps>
+              </a:ext>
+            </a:extLst>
+          </a:blip>
+          <a:stretch>
+            <a:fillRect/>
+          </a:stretch>
+        </p:blipFill>
+        <p:spPr>
+          <a:xfrm>
+            <a:off x="1184002" y="5049773"/>
+            <a:ext cx="1906161" cy="1906161"/>
+          </a:xfrm>
+          <a:prstGeom prst="rect">
+            <a:avLst/>
+          </a:prstGeom>
+        </p:spPr>
+      </p:pic>
+      <p:pic>
+        <p:nvPicPr>
+          <p:cNvPr id="1024" name="Picture 1023"/>
+          <p:cNvPicPr>
+            <a:picLocks noChangeAspect="1"/>
+          </p:cNvPicPr>
+          <p:nvPr/>
+        </p:nvPicPr>
+        <p:blipFill rotWithShape="1">
+          <a:blip r:embed="rId8">
+            <a:extLst>
+              <a:ext uri="{BEBA8EAE-BF5A-486C-A8C5-ECC9F3942E4B}">
+                <a14:imgProps xmlns:a14="http://schemas.microsoft.com/office/drawing/2010/main">
+                  <a14:imgLayer r:embed="rId9">
+                    <a14:imgEffect>
+                      <a14:backgroundRemoval t="10000" b="90000" l="10000" r="90000">
+                        <a14:backgroundMark x1="18611" y1="25278" x2="33333" y2="12500"/>
+                      </a14:backgroundRemoval>
+                    </a14:imgEffect>
+                  </a14:imgLayer>
+                </a14:imgProps>
+              </a:ext>
+            </a:extLst>
+          </a:blip>
+          <a:srcRect l="14022" t="10764" r="12517" b="15775"/>
+          <a:stretch/>
+        </p:blipFill>
+        <p:spPr>
+          <a:xfrm>
+            <a:off x="8784876" y="1163922"/>
+            <a:ext cx="1636776" cy="1636777"/>
+          </a:xfrm>
+          <a:prstGeom prst="rect">
+            <a:avLst/>
+          </a:prstGeom>
+        </p:spPr>
+      </p:pic>
+      <p:pic>
+        <p:nvPicPr>
+          <p:cNvPr id="35" name="Picture 34"/>
+          <p:cNvPicPr>
+            <a:picLocks noChangeAspect="1"/>
+          </p:cNvPicPr>
+          <p:nvPr/>
+        </p:nvPicPr>
+        <p:blipFill rotWithShape="1">
+          <a:blip r:embed="rId8">
+            <a:extLst>
+              <a:ext uri="{BEBA8EAE-BF5A-486C-A8C5-ECC9F3942E4B}">
+                <a14:imgProps xmlns:a14="http://schemas.microsoft.com/office/drawing/2010/main">
+                  <a14:imgLayer r:embed="rId9">
+                    <a14:imgEffect>
+                      <a14:backgroundRemoval t="10000" b="90000" l="10000" r="90000">
+                        <a14:backgroundMark x1="18611" y1="25278" x2="33333" y2="12500"/>
+                      </a14:backgroundRemoval>
+                    </a14:imgEffect>
+                  </a14:imgLayer>
+                </a14:imgProps>
+              </a:ext>
+            </a:extLst>
+          </a:blip>
+          <a:srcRect l="14022" t="10764" r="12517" b="15775"/>
+          <a:stretch/>
+        </p:blipFill>
+        <p:spPr>
+          <a:xfrm>
+            <a:off x="8784876" y="5221223"/>
+            <a:ext cx="1636776" cy="1636777"/>
+          </a:xfrm>
+          <a:prstGeom prst="rect">
+            <a:avLst/>
+          </a:prstGeom>
+        </p:spPr>
+      </p:pic>
+      <p:grpSp>
+        <p:nvGrpSpPr>
+          <p:cNvPr id="4" name="Group 3"/>
+          <p:cNvGrpSpPr/>
+          <p:nvPr/>
+        </p:nvGrpSpPr>
+        <p:grpSpPr>
+          <a:xfrm>
+            <a:off x="8390700" y="2863891"/>
+            <a:ext cx="2246376" cy="2246377"/>
+            <a:chOff x="8390700" y="2863891"/>
+            <a:chExt cx="2246376" cy="2246377"/>
+          </a:xfrm>
+        </p:grpSpPr>
+        <p:pic>
+          <p:nvPicPr>
+            <p:cNvPr id="34" name="Picture 33"/>
+            <p:cNvPicPr>
+              <a:picLocks noChangeAspect="1"/>
+            </p:cNvPicPr>
+            <p:nvPr/>
+          </p:nvPicPr>
+          <p:blipFill rotWithShape="1">
+            <a:blip r:embed="rId8">
+              <a:extLst>
+                <a:ext uri="{BEBA8EAE-BF5A-486C-A8C5-ECC9F3942E4B}">
+                  <a14:imgProps xmlns:a14="http://schemas.microsoft.com/office/drawing/2010/main">
+                    <a14:imgLayer r:embed="rId9">
+                      <a14:imgEffect>
+                        <a14:backgroundRemoval t="10000" b="90000" l="10000" r="90000">
+                          <a14:backgroundMark x1="18611" y1="25278" x2="33333" y2="12500"/>
+                        </a14:backgroundRemoval>
+                      </a14:imgEffect>
+                    </a14:imgLayer>
+                  </a14:imgProps>
+                </a:ext>
+              </a:extLst>
+            </a:blip>
+            <a:srcRect l="14022" t="10764" r="12517" b="15775"/>
+            <a:stretch/>
+          </p:blipFill>
+          <p:spPr>
+            <a:xfrm>
+              <a:off x="8390700" y="2863891"/>
+              <a:ext cx="1636776" cy="1636777"/>
+            </a:xfrm>
+            <a:prstGeom prst="rect">
+              <a:avLst/>
+            </a:prstGeom>
+          </p:spPr>
+        </p:pic>
+        <p:pic>
+          <p:nvPicPr>
+            <p:cNvPr id="36" name="Picture 35"/>
+            <p:cNvPicPr>
+              <a:picLocks noChangeAspect="1"/>
+            </p:cNvPicPr>
+            <p:nvPr/>
+          </p:nvPicPr>
+          <p:blipFill rotWithShape="1">
+            <a:blip r:embed="rId8">
+              <a:extLst>
+                <a:ext uri="{BEBA8EAE-BF5A-486C-A8C5-ECC9F3942E4B}">
+                  <a14:imgProps xmlns:a14="http://schemas.microsoft.com/office/drawing/2010/main">
+                    <a14:imgLayer r:embed="rId9">
+                      <a14:imgEffect>
+                        <a14:backgroundRemoval t="10000" b="90000" l="10000" r="90000">
+                          <a14:backgroundMark x1="18611" y1="25278" x2="33333" y2="12500"/>
+                        </a14:backgroundRemoval>
+                      </a14:imgEffect>
+                    </a14:imgLayer>
+                  </a14:imgProps>
+                </a:ext>
+              </a:extLst>
+            </a:blip>
+            <a:srcRect l="14022" t="10764" r="12517" b="15775"/>
+            <a:stretch/>
+          </p:blipFill>
+          <p:spPr>
+            <a:xfrm>
+              <a:off x="8543100" y="3016291"/>
+              <a:ext cx="1636776" cy="1636777"/>
+            </a:xfrm>
+            <a:prstGeom prst="rect">
+              <a:avLst/>
+            </a:prstGeom>
+          </p:spPr>
+        </p:pic>
+        <p:pic>
+          <p:nvPicPr>
+            <p:cNvPr id="37" name="Picture 36"/>
+            <p:cNvPicPr>
+              <a:picLocks noChangeAspect="1"/>
+            </p:cNvPicPr>
+            <p:nvPr/>
+          </p:nvPicPr>
+          <p:blipFill rotWithShape="1">
+            <a:blip r:embed="rId8">
+              <a:extLst>
+                <a:ext uri="{BEBA8EAE-BF5A-486C-A8C5-ECC9F3942E4B}">
+                  <a14:imgProps xmlns:a14="http://schemas.microsoft.com/office/drawing/2010/main">
+                    <a14:imgLayer r:embed="rId9">
+                      <a14:imgEffect>
+                        <a14:backgroundRemoval t="10000" b="90000" l="10000" r="90000">
+                          <a14:backgroundMark x1="18611" y1="25278" x2="33333" y2="12500"/>
+                        </a14:backgroundRemoval>
+                      </a14:imgEffect>
+                    </a14:imgLayer>
+                  </a14:imgProps>
+                </a:ext>
+              </a:extLst>
+            </a:blip>
+            <a:srcRect l="14022" t="10764" r="12517" b="15775"/>
+            <a:stretch/>
+          </p:blipFill>
+          <p:spPr>
+            <a:xfrm>
+              <a:off x="8695500" y="3168691"/>
+              <a:ext cx="1636776" cy="1636777"/>
+            </a:xfrm>
+            <a:prstGeom prst="rect">
+              <a:avLst/>
+            </a:prstGeom>
+          </p:spPr>
+        </p:pic>
+        <p:pic>
+          <p:nvPicPr>
+            <p:cNvPr id="38" name="Picture 37"/>
+            <p:cNvPicPr>
+              <a:picLocks noChangeAspect="1"/>
+            </p:cNvPicPr>
+            <p:nvPr/>
+          </p:nvPicPr>
+          <p:blipFill rotWithShape="1">
+            <a:blip r:embed="rId8">
+              <a:extLst>
+                <a:ext uri="{BEBA8EAE-BF5A-486C-A8C5-ECC9F3942E4B}">
+                  <a14:imgProps xmlns:a14="http://schemas.microsoft.com/office/drawing/2010/main">
+                    <a14:imgLayer r:embed="rId9">
+                      <a14:imgEffect>
+                        <a14:backgroundRemoval t="10000" b="90000" l="10000" r="90000">
+                          <a14:backgroundMark x1="18611" y1="25278" x2="33333" y2="12500"/>
+                        </a14:backgroundRemoval>
+                      </a14:imgEffect>
+                    </a14:imgLayer>
+                  </a14:imgProps>
+                </a:ext>
+              </a:extLst>
+            </a:blip>
+            <a:srcRect l="14022" t="10764" r="12517" b="15775"/>
+            <a:stretch/>
+          </p:blipFill>
+          <p:spPr>
+            <a:xfrm>
+              <a:off x="8847900" y="3321091"/>
+              <a:ext cx="1636776" cy="1636777"/>
+            </a:xfrm>
+            <a:prstGeom prst="rect">
+              <a:avLst/>
+            </a:prstGeom>
+          </p:spPr>
+        </p:pic>
+        <p:pic>
+          <p:nvPicPr>
+            <p:cNvPr id="39" name="Picture 38"/>
+            <p:cNvPicPr>
+              <a:picLocks noChangeAspect="1"/>
+            </p:cNvPicPr>
+            <p:nvPr/>
+          </p:nvPicPr>
+          <p:blipFill rotWithShape="1">
+            <a:blip r:embed="rId8">
+              <a:extLst>
+                <a:ext uri="{BEBA8EAE-BF5A-486C-A8C5-ECC9F3942E4B}">
+                  <a14:imgProps xmlns:a14="http://schemas.microsoft.com/office/drawing/2010/main">
+                    <a14:imgLayer r:embed="rId9">
+                      <a14:imgEffect>
+                        <a14:backgroundRemoval t="10000" b="90000" l="10000" r="90000">
+                          <a14:backgroundMark x1="18611" y1="25278" x2="33333" y2="12500"/>
+                        </a14:backgroundRemoval>
+                      </a14:imgEffect>
+                    </a14:imgLayer>
+                  </a14:imgProps>
+                </a:ext>
+              </a:extLst>
+            </a:blip>
+            <a:srcRect l="14022" t="10764" r="12517" b="15775"/>
+            <a:stretch/>
+          </p:blipFill>
+          <p:spPr>
+            <a:xfrm>
+              <a:off x="9000300" y="3473491"/>
+              <a:ext cx="1636776" cy="1636777"/>
+            </a:xfrm>
+            <a:prstGeom prst="rect">
+              <a:avLst/>
+            </a:prstGeom>
+          </p:spPr>
+        </p:pic>
+      </p:grpSp>
+    </p:spTree>
+    <p:extLst>
+      <p:ext uri="{BB962C8B-B14F-4D97-AF65-F5344CB8AC3E}">
+        <p14:creationId xmlns:p14="http://schemas.microsoft.com/office/powerpoint/2010/main" val="2522372939"/>
+      </p:ext>
+    </p:extLst>
+  </p:cSld>
+  <p:clrMapOvr>
+    <a:masterClrMapping/>
+  </p:clrMapOvr>
+  <p:timing>
+    <p:tnLst>
+      <p:par>
+        <p:cTn id="1" dur="indefinite" restart="never" nodeType="tmRoot"/>
+      </p:par>
+    </p:tnLst>
+  </p:timing>
+</p:sld>
+</file>
+
+<file path=ppt/slides/slide5.xml><?xml version="1.0" encoding="utf-8"?>
+<p:sld xmlns:a="http://schemas.openxmlformats.org/drawingml/2006/main" xmlns:r="http://schemas.openxmlformats.org/officeDocument/2006/relationships" xmlns:p="http://schemas.openxmlformats.org/presentationml/2006/main">
+  <p:cSld>
+    <p:spTree>
+      <p:nvGrpSpPr>
+        <p:cNvPr id="1" name=""/>
+        <p:cNvGrpSpPr/>
+        <p:nvPr/>
+      </p:nvGrpSpPr>
+      <p:grpSpPr>
+        <a:xfrm>
+          <a:off x="0" y="0"/>
+          <a:ext cx="0" cy="0"/>
+          <a:chOff x="0" y="0"/>
+          <a:chExt cx="0" cy="0"/>
+        </a:xfrm>
+      </p:grpSpPr>
+      <p:sp>
+        <p:nvSpPr>
+          <p:cNvPr id="2" name="Title 1"/>
+          <p:cNvSpPr>
+            <a:spLocks noGrp="1"/>
+          </p:cNvSpPr>
+          <p:nvPr>
+            <p:ph type="title"/>
+          </p:nvPr>
+        </p:nvSpPr>
+        <p:spPr/>
+        <p:txBody>
+          <a:bodyPr/>
+          <a:lstStyle/>
+          <a:p>
+            <a:r>
+              <a:rPr lang="en-US" dirty="0" smtClean="0"/>
+              <a:t>AI is like a child</a:t>
+            </a:r>
+            <a:endParaRPr lang="en-US" dirty="0"/>
+          </a:p>
+        </p:txBody>
+      </p:sp>
+      <p:sp>
+        <p:nvSpPr>
+          <p:cNvPr id="3" name="Content Placeholder 2"/>
+          <p:cNvSpPr>
+            <a:spLocks noGrp="1"/>
+          </p:cNvSpPr>
+          <p:nvPr>
+            <p:ph idx="1"/>
+          </p:nvPr>
+        </p:nvSpPr>
+        <p:spPr/>
+        <p:txBody>
+          <a:bodyPr/>
+          <a:lstStyle/>
+          <a:p>
+            <a:r>
+              <a:rPr lang="en-US" dirty="0" smtClean="0"/>
+              <a:t>Can take only one sandwich in a lunchbox</a:t>
+            </a:r>
+          </a:p>
+          <a:p>
+            <a:r>
+              <a:rPr lang="en-US" dirty="0" smtClean="0"/>
+              <a:t>Sandwich must be assembled </a:t>
+            </a:r>
+            <a:r>
+              <a:rPr lang="en-US" dirty="0" smtClean="0"/>
+              <a:t>beforehand</a:t>
+            </a:r>
+          </a:p>
+          <a:p>
+            <a:endParaRPr lang="en-US" dirty="0"/>
+          </a:p>
+          <a:p>
+            <a:endParaRPr lang="en-US" dirty="0" smtClean="0"/>
+          </a:p>
+          <a:p>
+            <a:r>
+              <a:rPr lang="en-US" dirty="0" smtClean="0"/>
+              <a:t>Images must be preprocessed before being sent to a Neural Net</a:t>
+            </a:r>
+          </a:p>
+          <a:p>
+            <a:pPr lvl="1"/>
+            <a:r>
+              <a:rPr lang="en-US" dirty="0" smtClean="0"/>
+              <a:t>Resize / rotate the image</a:t>
+            </a:r>
+          </a:p>
+          <a:p>
+            <a:pPr lvl="1"/>
+            <a:r>
+              <a:rPr lang="en-US" dirty="0" smtClean="0"/>
+              <a:t>Normalize color</a:t>
+            </a:r>
+          </a:p>
+          <a:p>
+            <a:pPr lvl="1"/>
+            <a:r>
+              <a:rPr lang="en-US" dirty="0" smtClean="0"/>
+              <a:t>Split into standard patches</a:t>
+            </a:r>
+          </a:p>
+          <a:p>
+            <a:pPr lvl="1"/>
+            <a:r>
+              <a:rPr lang="en-US" dirty="0"/>
+              <a:t>Toss all irrelevant </a:t>
+            </a:r>
+            <a:r>
+              <a:rPr lang="en-US" dirty="0" smtClean="0"/>
+              <a:t>parts (use </a:t>
+            </a:r>
+            <a:r>
+              <a:rPr lang="en-US" i="1" dirty="0" smtClean="0"/>
+              <a:t>annotations</a:t>
+            </a:r>
+            <a:r>
+              <a:rPr lang="en-US" dirty="0" smtClean="0"/>
+              <a:t>)</a:t>
+            </a:r>
+            <a:endParaRPr lang="en-US" dirty="0"/>
+          </a:p>
+          <a:p>
+            <a:pPr lvl="1"/>
+            <a:endParaRPr lang="en-US" dirty="0" smtClean="0"/>
+          </a:p>
+          <a:p>
+            <a:endParaRPr lang="en-US" dirty="0"/>
+          </a:p>
+        </p:txBody>
+      </p:sp>
+      <p:pic>
+        <p:nvPicPr>
+          <p:cNvPr id="4" name="Picture 3"/>
+          <p:cNvPicPr>
+            <a:picLocks noChangeAspect="1"/>
+          </p:cNvPicPr>
+          <p:nvPr/>
+        </p:nvPicPr>
+        <p:blipFill>
+          <a:blip r:embed="rId2">
+            <a:extLst>
+              <a:ext uri="{BEBA8EAE-BF5A-486C-A8C5-ECC9F3942E4B}">
+                <a14:imgProps xmlns:a14="http://schemas.microsoft.com/office/drawing/2010/main">
+                  <a14:imgLayer r:embed="rId3">
+                    <a14:imgEffect>
+                      <a14:backgroundRemoval t="500" b="100000" l="0" r="100000">
+                        <a14:foregroundMark x1="80952" y1="46500" x2="88095" y2="52000"/>
+                        <a14:backgroundMark x1="3175" y1="66500" x2="1984" y2="95500"/>
+                      </a14:backgroundRemoval>
+                    </a14:imgEffect>
+                  </a14:imgLayer>
+                </a14:imgProps>
+              </a:ext>
+            </a:extLst>
+          </a:blip>
+          <a:stretch>
+            <a:fillRect/>
+          </a:stretch>
+        </p:blipFill>
+        <p:spPr>
+          <a:xfrm>
+            <a:off x="8260842" y="1232916"/>
+            <a:ext cx="2400300" cy="1905000"/>
+          </a:xfrm>
+          <a:prstGeom prst="rect">
+            <a:avLst/>
+          </a:prstGeom>
+        </p:spPr>
+      </p:pic>
+    </p:spTree>
+    <p:extLst>
+      <p:ext uri="{BB962C8B-B14F-4D97-AF65-F5344CB8AC3E}">
+        <p14:creationId xmlns:p14="http://schemas.microsoft.com/office/powerpoint/2010/main" val="3363421079"/>
+      </p:ext>
+    </p:extLst>
+  </p:cSld>
+  <p:clrMapOvr>
+    <a:masterClrMapping/>
+  </p:clrMapOvr>
+  <p:timing>
+    <p:tnLst>
+      <p:par>
+        <p:cTn id="1" dur="indefinite" restart="never" nodeType="tmRoot"/>
+      </p:par>
+    </p:tnLst>
+  </p:timing>
+</p:sld>
+</file>
+
+<file path=ppt/slides/slide6.xml><?xml version="1.0" encoding="utf-8"?>
 <p:sld xmlns:a="http://schemas.openxmlformats.org/drawingml/2006/main" xmlns:r="http://schemas.openxmlformats.org/officeDocument/2006/relationships" xmlns:p="http://schemas.openxmlformats.org/presentationml/2006/main">
   <p:cSld>
     <p:spTree>
@@ -3523,10 +6734,17 @@
   <p:clrMapOvr>
     <a:masterClrMapping/>
   </p:clrMapOvr>
+  <p:timing>
+    <p:tnLst>
+      <p:par>
+        <p:cTn id="1" dur="indefinite" restart="never" nodeType="tmRoot"/>
+      </p:par>
+    </p:tnLst>
+  </p:timing>
 </p:sld>
 </file>
 
-<file path=ppt/slides/slide3.xml><?xml version="1.0" encoding="utf-8"?>
+<file path=ppt/slides/slide7.xml><?xml version="1.0" encoding="utf-8"?>
 <p:sld xmlns:a="http://schemas.openxmlformats.org/drawingml/2006/main" xmlns:r="http://schemas.openxmlformats.org/officeDocument/2006/relationships" xmlns:p="http://schemas.openxmlformats.org/presentationml/2006/main">
   <p:cSld>
     <p:spTree>
@@ -3613,15 +6831,15 @@
             </a:r>
             <a:r>
               <a:rPr lang="en-US" sz="2400" dirty="0" smtClean="0"/>
-              <a:t> (pro: less memory </a:t>
-            </a:r>
-            <a:r>
-              <a:rPr lang="en-US" sz="2400" dirty="0" err="1" smtClean="0"/>
-              <a:t>req’s</a:t>
+              <a:t> (pro: less </a:t>
             </a:r>
             <a:r>
               <a:rPr lang="en-US" sz="2400" dirty="0" smtClean="0"/>
-              <a:t>, easier processing by *you-the-</a:t>
+              <a:t>memory, </a:t>
+            </a:r>
+            <a:r>
+              <a:rPr lang="en-US" sz="2400" dirty="0" smtClean="0"/>
+              <a:t>easier processing by *you-the-</a:t>
             </a:r>
             <a:r>
               <a:rPr lang="en-US" sz="2400" dirty="0" err="1" smtClean="0"/>
@@ -3675,10 +6893,17 @@
   <p:clrMapOvr>
     <a:masterClrMapping/>
   </p:clrMapOvr>
+  <p:timing>
+    <p:tnLst>
+      <p:par>
+        <p:cTn id="1" dur="indefinite" restart="never" nodeType="tmRoot"/>
+      </p:par>
+    </p:tnLst>
+  </p:timing>
 </p:sld>
 </file>
 
-<file path=ppt/slides/slide4.xml><?xml version="1.0" encoding="utf-8"?>
+<file path=ppt/slides/slide8.xml><?xml version="1.0" encoding="utf-8"?>
 <p:sld xmlns:a="http://schemas.openxmlformats.org/drawingml/2006/main" xmlns:r="http://schemas.openxmlformats.org/officeDocument/2006/relationships" xmlns:p="http://schemas.openxmlformats.org/presentationml/2006/main">
   <p:cSld>
     <p:spTree>
@@ -3905,10 +7130,17 @@
   <p:clrMapOvr>
     <a:masterClrMapping/>
   </p:clrMapOvr>
+  <p:timing>
+    <p:tnLst>
+      <p:par>
+        <p:cTn id="1" dur="indefinite" restart="never" nodeType="tmRoot"/>
+      </p:par>
+    </p:tnLst>
+  </p:timing>
 </p:sld>
 </file>
 
-<file path=ppt/slides/slide5.xml><?xml version="1.0" encoding="utf-8"?>
+<file path=ppt/slides/slide9.xml><?xml version="1.0" encoding="utf-8"?>
 <p:sld xmlns:a="http://schemas.openxmlformats.org/drawingml/2006/main" xmlns:r="http://schemas.openxmlformats.org/officeDocument/2006/relationships" xmlns:p="http://schemas.openxmlformats.org/presentationml/2006/main">
   <p:cSld>
     <p:spTree>
@@ -3935,10 +7167,37 @@
             <p:ph type="title"/>
           </p:nvPr>
         </p:nvSpPr>
+        <p:spPr/>
+        <p:txBody>
+          <a:bodyPr/>
+          <a:lstStyle/>
+          <a:p>
+            <a:r>
+              <a:rPr lang="en-US" dirty="0" err="1"/>
+              <a:t>F</a:t>
+            </a:r>
+            <a:r>
+              <a:rPr lang="en-US" dirty="0" err="1" smtClean="0"/>
+              <a:t>loodfilling</a:t>
+            </a:r>
+            <a:endParaRPr lang="en-US" dirty="0"/>
+          </a:p>
+        </p:txBody>
+      </p:sp>
+      <p:sp>
+        <p:nvSpPr>
+          <p:cNvPr id="3" name="Content Placeholder 2"/>
+          <p:cNvSpPr>
+            <a:spLocks noGrp="1"/>
+          </p:cNvSpPr>
+          <p:nvPr>
+            <p:ph idx="1"/>
+          </p:nvPr>
+        </p:nvSpPr>
         <p:spPr>
           <a:xfrm>
-            <a:off x="838200" y="365125"/>
-            <a:ext cx="10515600" cy="662397"/>
+            <a:off x="838200" y="6171988"/>
+            <a:ext cx="10515600" cy="485084"/>
           </a:xfrm>
         </p:spPr>
         <p:txBody>
@@ -3947,558 +7206,121 @@
           </a:bodyPr>
           <a:lstStyle/>
           <a:p>
-            <a:r>
-              <a:rPr lang="en-US" sz="3600" dirty="0" smtClean="0"/>
-              <a:t>Data for the </a:t>
-            </a:r>
-            <a:r>
-              <a:rPr lang="en-US" sz="3600" b="1" i="1" dirty="0" smtClean="0"/>
-              <a:t>algorithm</a:t>
-            </a:r>
-            <a:endParaRPr lang="en-US" sz="3600" b="1" i="1" dirty="0"/>
-          </a:p>
-        </p:txBody>
-      </p:sp>
-      <p:sp>
-        <p:nvSpPr>
-          <p:cNvPr id="3" name="Content Placeholder 2"/>
-          <p:cNvSpPr>
-            <a:spLocks noGrp="1"/>
-          </p:cNvSpPr>
-          <p:nvPr>
-            <p:ph idx="1"/>
-          </p:nvPr>
-        </p:nvSpPr>
-        <p:spPr>
-          <a:xfrm>
-            <a:off x="838200" y="1517715"/>
-            <a:ext cx="10515600" cy="4659248"/>
-          </a:xfrm>
-        </p:spPr>
-        <p:txBody>
-          <a:bodyPr>
-            <a:normAutofit/>
-          </a:bodyPr>
-          <a:lstStyle/>
-          <a:p>
-            <a:r>
-              <a:rPr lang="en-US" sz="2000" dirty="0" smtClean="0"/>
-              <a:t>Large images may require partition</a:t>
-            </a:r>
-          </a:p>
-          <a:p>
-            <a:r>
-              <a:rPr lang="en-US" sz="2000" dirty="0" smtClean="0"/>
-              <a:t>Use the partition of the </a:t>
-            </a:r>
-            <a:r>
-              <a:rPr lang="en-US" sz="2000" i="1" u="sng" dirty="0" smtClean="0"/>
-              <a:t>masked </a:t>
-            </a:r>
-            <a:r>
-              <a:rPr lang="en-US" sz="2000" dirty="0" smtClean="0"/>
-              <a:t>image</a:t>
-            </a:r>
-          </a:p>
-          <a:p>
-            <a:r>
-              <a:rPr lang="en-US" sz="2000" dirty="0" smtClean="0"/>
-              <a:t>The mask plays important role</a:t>
-            </a:r>
-          </a:p>
-          <a:p>
-            <a:r>
-              <a:rPr lang="en-US" sz="2000" dirty="0" smtClean="0"/>
-              <a:t>Save your every output!!</a:t>
-            </a:r>
-            <a:endParaRPr lang="en-US" sz="2000" dirty="0"/>
+            <a:pPr marL="0" indent="0" algn="ctr">
+              <a:buNone/>
+            </a:pPr>
+            <a:r>
+              <a:rPr lang="en-US" sz="2000" dirty="0">
+                <a:solidFill>
+                  <a:schemeClr val="bg1">
+                    <a:lumMod val="85000"/>
+                  </a:schemeClr>
+                </a:solidFill>
+              </a:rPr>
+              <a:t>https://en.wikipedia.org/wiki/Flood_fill</a:t>
+            </a:r>
           </a:p>
         </p:txBody>
       </p:sp>
       <p:pic>
         <p:nvPicPr>
-          <p:cNvPr id="4" name="Picture"/>
+          <p:cNvPr id="1026" name="Picture 2" descr="https://upload.wikimedia.org/wikipedia/commons/b/b7/Smiley_fill.gif"/>
           <p:cNvPicPr>
-            <a:picLocks noChangeAspect="1"/>
+            <a:picLocks noChangeAspect="1" noChangeArrowheads="1" noCrop="1"/>
           </p:cNvPicPr>
           <p:nvPr/>
         </p:nvPicPr>
         <p:blipFill>
-          <a:blip r:embed="rId2"/>
+          <a:blip r:embed="rId2">
+            <a:extLst>
+              <a:ext uri="{28A0092B-C50C-407E-A947-70E740481C1C}">
+                <a14:useLocalDpi xmlns:a14="http://schemas.microsoft.com/office/drawing/2010/main" val="0"/>
+              </a:ext>
+            </a:extLst>
+          </a:blip>
+          <a:srcRect/>
           <a:stretch>
             <a:fillRect/>
           </a:stretch>
         </p:blipFill>
         <p:spPr bwMode="auto">
           <a:xfrm>
-            <a:off x="295461" y="3381415"/>
-            <a:ext cx="11601077" cy="2708299"/>
+            <a:off x="1139922" y="1601337"/>
+            <a:ext cx="4048125" cy="3819525"/>
           </a:xfrm>
           <a:prstGeom prst="rect">
             <a:avLst/>
           </a:prstGeom>
           <a:noFill/>
-          <a:ln w="9525">
-            <a:noFill/>
-            <a:headEnd/>
-            <a:tailEnd/>
-          </a:ln>
+          <a:extLst>
+            <a:ext uri="{909E8E84-426E-40DD-AFC4-6F175D3DCCD1}">
+              <a14:hiddenFill xmlns:a14="http://schemas.microsoft.com/office/drawing/2010/main">
+                <a:solidFill>
+                  <a:srgbClr val="FFFFFF"/>
+                </a:solidFill>
+              </a14:hiddenFill>
+            </a:ext>
+          </a:extLst>
+        </p:spPr>
+      </p:pic>
+      <p:pic>
+        <p:nvPicPr>
+          <p:cNvPr id="1030" name="Picture 6" descr="https://upload.wikimedia.org/wikipedia/commons/b/b6/Wfm_floodfill_animation_queue.gif"/>
+          <p:cNvPicPr>
+            <a:picLocks noChangeAspect="1" noChangeArrowheads="1" noCrop="1"/>
+          </p:cNvPicPr>
+          <p:nvPr/>
+        </p:nvPicPr>
+        <p:blipFill>
+          <a:blip r:embed="rId3">
+            <a:extLst>
+              <a:ext uri="{28A0092B-C50C-407E-A947-70E740481C1C}">
+                <a14:useLocalDpi xmlns:a14="http://schemas.microsoft.com/office/drawing/2010/main" val="0"/>
+              </a:ext>
+            </a:extLst>
+          </a:blip>
+          <a:srcRect/>
+          <a:stretch>
+            <a:fillRect/>
+          </a:stretch>
+        </p:blipFill>
+        <p:spPr bwMode="auto">
+          <a:xfrm>
+            <a:off x="6690581" y="1330318"/>
+            <a:ext cx="4361561" cy="4361561"/>
+          </a:xfrm>
+          <a:prstGeom prst="rect">
+            <a:avLst/>
+          </a:prstGeom>
+          <a:noFill/>
+          <a:extLst>
+            <a:ext uri="{909E8E84-426E-40DD-AFC4-6F175D3DCCD1}">
+              <a14:hiddenFill xmlns:a14="http://schemas.microsoft.com/office/drawing/2010/main">
+                <a:solidFill>
+                  <a:srgbClr val="FFFFFF"/>
+                </a:solidFill>
+              </a14:hiddenFill>
+            </a:ext>
+          </a:extLst>
         </p:spPr>
       </p:pic>
     </p:spTree>
     <p:extLst>
       <p:ext uri="{BB962C8B-B14F-4D97-AF65-F5344CB8AC3E}">
-        <p14:creationId xmlns:p14="http://schemas.microsoft.com/office/powerpoint/2010/main" val="2421962130"/>
+        <p14:creationId xmlns:p14="http://schemas.microsoft.com/office/powerpoint/2010/main" val="609640696"/>
       </p:ext>
     </p:extLst>
   </p:cSld>
   <p:clrMapOvr>
     <a:masterClrMapping/>
   </p:clrMapOvr>
-</p:sld>
-</file>
-
-<file path=ppt/slides/slide6.xml><?xml version="1.0" encoding="utf-8"?>
-<p:sld xmlns:a="http://schemas.openxmlformats.org/drawingml/2006/main" xmlns:r="http://schemas.openxmlformats.org/officeDocument/2006/relationships" xmlns:p="http://schemas.openxmlformats.org/presentationml/2006/main">
-  <p:cSld>
-    <p:spTree>
-      <p:nvGrpSpPr>
-        <p:cNvPr id="1" name=""/>
-        <p:cNvGrpSpPr/>
-        <p:nvPr/>
-      </p:nvGrpSpPr>
-      <p:grpSpPr>
-        <a:xfrm>
-          <a:off x="0" y="0"/>
-          <a:ext cx="0" cy="0"/>
-          <a:chOff x="0" y="0"/>
-          <a:chExt cx="0" cy="0"/>
-        </a:xfrm>
-      </p:grpSpPr>
-      <p:sp>
-        <p:nvSpPr>
-          <p:cNvPr id="2" name="Title 1"/>
-          <p:cNvSpPr>
-            <a:spLocks noGrp="1"/>
-          </p:cNvSpPr>
-          <p:nvPr>
-            <p:ph type="title"/>
-          </p:nvPr>
-        </p:nvSpPr>
-        <p:spPr>
-          <a:xfrm>
-            <a:off x="838200" y="365126"/>
-            <a:ext cx="10515600" cy="511568"/>
-          </a:xfrm>
-        </p:spPr>
-        <p:txBody>
-          <a:bodyPr>
-            <a:normAutofit fontScale="90000"/>
-          </a:bodyPr>
-          <a:lstStyle/>
-          <a:p>
-            <a:r>
-              <a:rPr lang="en-US" sz="4000" dirty="0" smtClean="0"/>
-              <a:t>Hands-on</a:t>
-            </a:r>
-            <a:endParaRPr lang="en-US" sz="3600" dirty="0"/>
-          </a:p>
-        </p:txBody>
-      </p:sp>
-      <p:sp>
-        <p:nvSpPr>
-          <p:cNvPr id="3" name="Content Placeholder 2"/>
-          <p:cNvSpPr>
-            <a:spLocks noGrp="1"/>
-          </p:cNvSpPr>
-          <p:nvPr>
-            <p:ph idx="1"/>
-          </p:nvPr>
-        </p:nvSpPr>
-        <p:spPr/>
-        <p:txBody>
-          <a:bodyPr>
-            <a:normAutofit/>
-          </a:bodyPr>
-          <a:lstStyle/>
-          <a:p>
-            <a:r>
-              <a:rPr lang="en-US" sz="2000" dirty="0" smtClean="0"/>
-              <a:t>Dataset: kaggle.com/datasets/</a:t>
-            </a:r>
-            <a:r>
-              <a:rPr lang="en-US" sz="2000" dirty="0" err="1" smtClean="0"/>
-              <a:t>preetviradiya</a:t>
-            </a:r>
-            <a:r>
-              <a:rPr lang="en-US" sz="2000" dirty="0" smtClean="0"/>
-              <a:t>/covid19-radiography-dataset</a:t>
-            </a:r>
-          </a:p>
-          <a:p>
-            <a:pPr lvl="1"/>
-            <a:r>
-              <a:rPr lang="en-US" sz="1600" dirty="0" smtClean="0"/>
-              <a:t>X-rays of lungs: Normal (Healthy), </a:t>
-            </a:r>
-            <a:r>
-              <a:rPr lang="en-US" sz="1600" dirty="0" err="1" smtClean="0"/>
-              <a:t>Covid</a:t>
-            </a:r>
-            <a:r>
-              <a:rPr lang="en-US" sz="1600" dirty="0" smtClean="0"/>
-              <a:t>, </a:t>
-            </a:r>
-            <a:r>
-              <a:rPr lang="en-US" sz="1600" dirty="0" err="1" smtClean="0"/>
-              <a:t>etc</a:t>
-            </a:r>
-            <a:endParaRPr lang="en-US" sz="1600" dirty="0"/>
-          </a:p>
-          <a:p>
-            <a:r>
-              <a:rPr lang="en-US" sz="2000" dirty="0" smtClean="0"/>
-              <a:t>Download </a:t>
-            </a:r>
-            <a:endParaRPr lang="en-US" sz="2000" dirty="0"/>
-          </a:p>
-          <a:p>
-            <a:pPr lvl="1"/>
-            <a:r>
-              <a:rPr lang="en-US" sz="1600" dirty="0" smtClean="0"/>
-              <a:t>N images from Normal </a:t>
-            </a:r>
-            <a:endParaRPr lang="en-US" sz="1600" dirty="0"/>
-          </a:p>
-          <a:p>
-            <a:pPr lvl="1"/>
-            <a:r>
-              <a:rPr lang="en-US" sz="1600" dirty="0" smtClean="0"/>
-              <a:t>N images from COVID</a:t>
-            </a:r>
-          </a:p>
-          <a:p>
-            <a:pPr lvl="1"/>
-            <a:r>
-              <a:rPr lang="en-US" sz="1600" dirty="0" smtClean="0"/>
-              <a:t>N &lt; 5 for today</a:t>
-            </a:r>
-          </a:p>
-          <a:p>
-            <a:r>
-              <a:rPr lang="en-US" sz="2000" dirty="0" smtClean="0"/>
-              <a:t>Organize images</a:t>
-            </a:r>
-          </a:p>
-          <a:p>
-            <a:r>
-              <a:rPr lang="en-US" sz="2000" dirty="0" smtClean="0"/>
-              <a:t>Produce annotations</a:t>
-            </a:r>
-          </a:p>
-          <a:p>
-            <a:r>
-              <a:rPr lang="en-US" sz="2000" dirty="0" smtClean="0"/>
-              <a:t>Follow the me in </a:t>
-            </a:r>
-            <a:r>
-              <a:rPr lang="en-US" sz="2000" dirty="0" err="1" smtClean="0"/>
-              <a:t>Jupyter</a:t>
-            </a:r>
-            <a:r>
-              <a:rPr lang="en-US" sz="2000" dirty="0" smtClean="0"/>
-              <a:t> </a:t>
-            </a:r>
-          </a:p>
-          <a:p>
-            <a:endParaRPr lang="en-US" sz="2000" dirty="0"/>
-          </a:p>
-        </p:txBody>
-      </p:sp>
-      <p:pic>
-        <p:nvPicPr>
-          <p:cNvPr id="6" name="Picture 5"/>
-          <p:cNvPicPr>
-            <a:picLocks noChangeAspect="1"/>
-          </p:cNvPicPr>
-          <p:nvPr/>
-        </p:nvPicPr>
-        <p:blipFill>
-          <a:blip r:embed="rId2"/>
-          <a:stretch>
-            <a:fillRect/>
-          </a:stretch>
-        </p:blipFill>
-        <p:spPr>
-          <a:xfrm>
-            <a:off x="4128941" y="2682394"/>
-            <a:ext cx="7633796" cy="2986355"/>
-          </a:xfrm>
-          <a:prstGeom prst="rect">
-            <a:avLst/>
-          </a:prstGeom>
-          <a:ln w="28575">
-            <a:solidFill>
-              <a:srgbClr val="00B050"/>
-            </a:solidFill>
-          </a:ln>
-        </p:spPr>
-      </p:pic>
-      <p:sp>
-        <p:nvSpPr>
-          <p:cNvPr id="7" name="Explosion 2 6"/>
-          <p:cNvSpPr/>
-          <p:nvPr/>
-        </p:nvSpPr>
-        <p:spPr>
-          <a:xfrm rot="1403211">
-            <a:off x="9366463" y="3237400"/>
-            <a:ext cx="3097586" cy="2787861"/>
-          </a:xfrm>
-          <a:prstGeom prst="irregularSeal2">
-            <a:avLst/>
-          </a:prstGeom>
-          <a:noFill/>
-          <a:ln w="38100">
-            <a:solidFill>
-              <a:srgbClr val="FF0000"/>
-            </a:solidFill>
-          </a:ln>
-        </p:spPr>
-        <p:style>
-          <a:lnRef idx="2">
-            <a:schemeClr val="accent1">
-              <a:shade val="50000"/>
-            </a:schemeClr>
-          </a:lnRef>
-          <a:fillRef idx="1">
-            <a:schemeClr val="accent1"/>
-          </a:fillRef>
-          <a:effectRef idx="0">
-            <a:schemeClr val="accent1"/>
-          </a:effectRef>
-          <a:fontRef idx="minor">
-            <a:schemeClr val="lt1"/>
-          </a:fontRef>
-        </p:style>
-        <p:txBody>
-          <a:bodyPr rtlCol="0" anchor="ctr"/>
-          <a:lstStyle/>
-          <a:p>
-            <a:pPr algn="ctr"/>
-            <a:endParaRPr lang="en-US"/>
-          </a:p>
-        </p:txBody>
-      </p:sp>
-    </p:spTree>
-    <p:extLst>
-      <p:ext uri="{BB962C8B-B14F-4D97-AF65-F5344CB8AC3E}">
-        <p14:creationId xmlns:p14="http://schemas.microsoft.com/office/powerpoint/2010/main" val="2006271638"/>
-      </p:ext>
-    </p:extLst>
-  </p:cSld>
-  <p:clrMapOvr>
-    <a:masterClrMapping/>
-  </p:clrMapOvr>
-</p:sld>
-</file>
-
-<file path=ppt/slides/slide7.xml><?xml version="1.0" encoding="utf-8"?>
-<p:sld xmlns:a="http://schemas.openxmlformats.org/drawingml/2006/main" xmlns:r="http://schemas.openxmlformats.org/officeDocument/2006/relationships" xmlns:p="http://schemas.openxmlformats.org/presentationml/2006/main">
-  <p:cSld>
-    <p:spTree>
-      <p:nvGrpSpPr>
-        <p:cNvPr id="1" name=""/>
-        <p:cNvGrpSpPr/>
-        <p:nvPr/>
-      </p:nvGrpSpPr>
-      <p:grpSpPr>
-        <a:xfrm>
-          <a:off x="0" y="0"/>
-          <a:ext cx="0" cy="0"/>
-          <a:chOff x="0" y="0"/>
-          <a:chExt cx="0" cy="0"/>
-        </a:xfrm>
-      </p:grpSpPr>
-      <p:sp>
-        <p:nvSpPr>
-          <p:cNvPr id="2" name="Title 1"/>
-          <p:cNvSpPr>
-            <a:spLocks noGrp="1"/>
-          </p:cNvSpPr>
-          <p:nvPr>
-            <p:ph type="title"/>
-          </p:nvPr>
-        </p:nvSpPr>
-        <p:spPr>
-          <a:xfrm>
-            <a:off x="838200" y="365126"/>
-            <a:ext cx="10515600" cy="511568"/>
-          </a:xfrm>
-        </p:spPr>
-        <p:txBody>
-          <a:bodyPr>
-            <a:normAutofit fontScale="90000"/>
-          </a:bodyPr>
-          <a:lstStyle/>
-          <a:p>
-            <a:r>
-              <a:rPr lang="en-US" sz="4000" dirty="0" smtClean="0"/>
-              <a:t>Hands-on</a:t>
-            </a:r>
-            <a:endParaRPr lang="en-US" sz="3600" dirty="0"/>
-          </a:p>
-        </p:txBody>
-      </p:sp>
-      <p:sp>
-        <p:nvSpPr>
-          <p:cNvPr id="3" name="Content Placeholder 2"/>
-          <p:cNvSpPr>
-            <a:spLocks noGrp="1"/>
-          </p:cNvSpPr>
-          <p:nvPr>
-            <p:ph idx="1"/>
-          </p:nvPr>
-        </p:nvSpPr>
-        <p:spPr/>
-        <p:txBody>
-          <a:bodyPr>
-            <a:normAutofit/>
-          </a:bodyPr>
-          <a:lstStyle/>
-          <a:p>
-            <a:r>
-              <a:rPr lang="en-US" sz="2000" dirty="0" smtClean="0"/>
-              <a:t>Dataset: kaggle.com/datasets/</a:t>
-            </a:r>
-            <a:r>
-              <a:rPr lang="en-US" sz="2000" dirty="0" err="1" smtClean="0"/>
-              <a:t>preetviradiya</a:t>
-            </a:r>
-            <a:r>
-              <a:rPr lang="en-US" sz="2000" dirty="0" smtClean="0"/>
-              <a:t>/covid19-radiography-dataset</a:t>
-            </a:r>
-          </a:p>
-          <a:p>
-            <a:pPr lvl="1"/>
-            <a:r>
-              <a:rPr lang="en-US" sz="1600" dirty="0" smtClean="0"/>
-              <a:t>X-rays of lungs: Normal (Healthy), </a:t>
-            </a:r>
-            <a:r>
-              <a:rPr lang="en-US" sz="1600" dirty="0" err="1" smtClean="0"/>
-              <a:t>Covid</a:t>
-            </a:r>
-            <a:r>
-              <a:rPr lang="en-US" sz="1600" dirty="0" smtClean="0"/>
-              <a:t>, </a:t>
-            </a:r>
-            <a:r>
-              <a:rPr lang="en-US" sz="1600" dirty="0" err="1" smtClean="0"/>
-              <a:t>etc</a:t>
-            </a:r>
-            <a:endParaRPr lang="en-US" sz="1600" dirty="0"/>
-          </a:p>
-          <a:p>
-            <a:r>
-              <a:rPr lang="en-US" sz="2000" dirty="0" smtClean="0"/>
-              <a:t>Download </a:t>
-            </a:r>
-            <a:endParaRPr lang="en-US" sz="2000" dirty="0"/>
-          </a:p>
-          <a:p>
-            <a:pPr lvl="1"/>
-            <a:r>
-              <a:rPr lang="en-US" sz="1600" dirty="0" smtClean="0"/>
-              <a:t>N images from Normal </a:t>
-            </a:r>
-            <a:endParaRPr lang="en-US" sz="1600" dirty="0"/>
-          </a:p>
-          <a:p>
-            <a:pPr lvl="1"/>
-            <a:r>
-              <a:rPr lang="en-US" sz="1600" dirty="0" smtClean="0"/>
-              <a:t>N images from COVID</a:t>
-            </a:r>
-          </a:p>
-          <a:p>
-            <a:pPr lvl="1"/>
-            <a:r>
-              <a:rPr lang="en-US" sz="1600" dirty="0" smtClean="0"/>
-              <a:t>N &lt; 5 for today</a:t>
-            </a:r>
-          </a:p>
-          <a:p>
-            <a:r>
-              <a:rPr lang="en-US" sz="2000" dirty="0" smtClean="0"/>
-              <a:t>Organize images</a:t>
-            </a:r>
-          </a:p>
-          <a:p>
-            <a:r>
-              <a:rPr lang="en-US" sz="2000" dirty="0" smtClean="0"/>
-              <a:t>Produce annotations</a:t>
-            </a:r>
-          </a:p>
-          <a:p>
-            <a:r>
-              <a:rPr lang="en-US" sz="2000" dirty="0" smtClean="0"/>
-              <a:t>Follow the me in </a:t>
-            </a:r>
-            <a:r>
-              <a:rPr lang="en-US" sz="2000" dirty="0" err="1" smtClean="0"/>
-              <a:t>Jupyter</a:t>
-            </a:r>
-            <a:r>
-              <a:rPr lang="en-US" sz="2000" dirty="0" smtClean="0"/>
-              <a:t> </a:t>
-            </a:r>
-          </a:p>
-          <a:p>
-            <a:endParaRPr lang="en-US" sz="2000" dirty="0"/>
-          </a:p>
-        </p:txBody>
-      </p:sp>
-      <p:pic>
-        <p:nvPicPr>
-          <p:cNvPr id="6" name="Picture 5"/>
-          <p:cNvPicPr>
-            <a:picLocks noChangeAspect="1"/>
-          </p:cNvPicPr>
-          <p:nvPr/>
-        </p:nvPicPr>
-        <p:blipFill>
-          <a:blip r:embed="rId2"/>
-          <a:stretch>
-            <a:fillRect/>
-          </a:stretch>
-        </p:blipFill>
-        <p:spPr>
-          <a:xfrm>
-            <a:off x="4761862" y="2820774"/>
-            <a:ext cx="7000875" cy="2847975"/>
-          </a:xfrm>
-          <a:prstGeom prst="rect">
-            <a:avLst/>
-          </a:prstGeom>
-          <a:ln w="28575">
-            <a:solidFill>
-              <a:srgbClr val="00B050"/>
-            </a:solidFill>
-          </a:ln>
-        </p:spPr>
-      </p:pic>
-    </p:spTree>
-    <p:extLst>
-      <p:ext uri="{BB962C8B-B14F-4D97-AF65-F5344CB8AC3E}">
-        <p14:creationId xmlns:p14="http://schemas.microsoft.com/office/powerpoint/2010/main" val="707485935"/>
-      </p:ext>
-    </p:extLst>
-  </p:cSld>
-  <p:clrMapOvr>
-    <a:masterClrMapping/>
-  </p:clrMapOvr>
+  <p:timing>
+    <p:tnLst>
+      <p:par>
+        <p:cTn id="1" dur="indefinite" restart="never" nodeType="tmRoot"/>
+      </p:par>
+    </p:tnLst>
+  </p:timing>
 </p:sld>
 </file>
 

</xml_diff>